<commit_message>
first part of presentation almost finished
</commit_message>
<xml_diff>
--- a/first part/Improved bounds for planar k-sets.pptx
+++ b/first part/Improved bounds for planar k-sets.pptx
@@ -10,6 +10,11 @@
     <p:sldId id="258" r:id="rId4"/>
     <p:sldId id="259" r:id="rId5"/>
     <p:sldId id="260" r:id="rId6"/>
+    <p:sldId id="261" r:id="rId7"/>
+    <p:sldId id="263" r:id="rId8"/>
+    <p:sldId id="264" r:id="rId9"/>
+    <p:sldId id="265" r:id="rId10"/>
+    <p:sldId id="262" r:id="rId11"/>
   </p:sldIdLst>
   <p:sldSz cx="12192000" cy="6858000"/>
   <p:notesSz cx="6858000" cy="9144000"/>
@@ -108,6 +113,11 @@
       </a:defRPr>
     </a:lvl9pPr>
   </p:defaultTextStyle>
+  <p:extLst>
+    <p:ext uri="{EFAFB233-063F-42B5-8137-9DF3F51BA10A}">
+      <p15:sldGuideLst xmlns:p15="http://schemas.microsoft.com/office/powerpoint/2012/main"/>
+    </p:ext>
+  </p:extLst>
 </p:presentation>
 </file>
 
@@ -274,7 +284,7 @@
           <a:p>
             <a:fld id="{1160EA64-D806-43AC-9DF2-F8C432F32B4C}" type="datetimeFigureOut">
               <a:rPr lang="en-US" smtClean="0"/>
-              <a:t>5/22/2020</a:t>
+              <a:t>5/23/2020</a:t>
             </a:fld>
             <a:endParaRPr lang="en-US" dirty="0"/>
           </a:p>
@@ -445,7 +455,7 @@
           <a:p>
             <a:fld id="{E9F9C37B-1D36-470B-8223-D6C91242EC14}" type="datetimeFigureOut">
               <a:rPr lang="en-US" smtClean="0"/>
-              <a:t>5/22/2020</a:t>
+              <a:t>5/23/2020</a:t>
             </a:fld>
             <a:endParaRPr lang="en-US" dirty="0"/>
           </a:p>
@@ -625,7 +635,7 @@
           <a:p>
             <a:fld id="{67C6F52A-A82B-47A2-A83A-8C4C91F2D59F}" type="datetimeFigureOut">
               <a:rPr lang="en-US" smtClean="0"/>
-              <a:t>5/22/2020</a:t>
+              <a:t>5/23/2020</a:t>
             </a:fld>
             <a:endParaRPr lang="en-US" dirty="0"/>
           </a:p>
@@ -795,7 +805,7 @@
           <a:p>
             <a:fld id="{F070A7B3-6521-4DCA-87E5-044747A908C1}" type="datetimeFigureOut">
               <a:rPr lang="en-US" smtClean="0"/>
-              <a:t>5/22/2020</a:t>
+              <a:t>5/23/2020</a:t>
             </a:fld>
             <a:endParaRPr lang="en-US" dirty="0"/>
           </a:p>
@@ -1064,7 +1074,7 @@
           <a:p>
             <a:fld id="{1160EA64-D806-43AC-9DF2-F8C432F32B4C}" type="datetimeFigureOut">
               <a:rPr lang="en-US" smtClean="0"/>
-              <a:t>5/22/2020</a:t>
+              <a:t>5/23/2020</a:t>
             </a:fld>
             <a:endParaRPr lang="en-US" dirty="0"/>
           </a:p>
@@ -1297,7 +1307,7 @@
           <a:p>
             <a:fld id="{AB134690-1557-4C89-A502-4959FE7FAD70}" type="datetimeFigureOut">
               <a:rPr lang="en-US" smtClean="0"/>
-              <a:t>5/22/2020</a:t>
+              <a:t>5/23/2020</a:t>
             </a:fld>
             <a:endParaRPr lang="en-US" dirty="0"/>
           </a:p>
@@ -1656,7 +1666,7 @@
           <a:p>
             <a:fld id="{4F7D4976-E339-4826-83B7-FBD03F55ECF8}" type="datetimeFigureOut">
               <a:rPr lang="en-US" smtClean="0"/>
-              <a:t>5/22/2020</a:t>
+              <a:t>5/23/2020</a:t>
             </a:fld>
             <a:endParaRPr lang="en-US" dirty="0"/>
           </a:p>
@@ -1797,7 +1807,7 @@
           <a:p>
             <a:fld id="{E1037C31-9E7A-4F99-8774-A0E530DE1A42}" type="datetimeFigureOut">
               <a:rPr lang="en-US" smtClean="0"/>
-              <a:t>5/22/2020</a:t>
+              <a:t>5/23/2020</a:t>
             </a:fld>
             <a:endParaRPr lang="en-US" dirty="0"/>
           </a:p>
@@ -1892,7 +1902,7 @@
           <a:p>
             <a:fld id="{C278504F-A551-4DE0-9316-4DCD1D8CC752}" type="datetimeFigureOut">
               <a:rPr lang="en-US" smtClean="0"/>
-              <a:t>5/22/2020</a:t>
+              <a:t>5/23/2020</a:t>
             </a:fld>
             <a:endParaRPr lang="en-US" dirty="0"/>
           </a:p>
@@ -2249,7 +2259,7 @@
           <a:p>
             <a:fld id="{D1BE4249-C0D0-4B06-8692-E8BB871AF643}" type="datetimeFigureOut">
               <a:rPr lang="en-US" smtClean="0"/>
-              <a:t>5/22/2020</a:t>
+              <a:t>5/23/2020</a:t>
             </a:fld>
             <a:endParaRPr lang="en-US" dirty="0"/>
           </a:p>
@@ -2606,7 +2616,7 @@
           <a:p>
             <a:fld id="{042B0DB6-F5C7-45FB-8CF3-31B45F9C2DAC}" type="datetimeFigureOut">
               <a:rPr lang="en-US" smtClean="0"/>
-              <a:t>5/22/2020</a:t>
+              <a:t>5/23/2020</a:t>
             </a:fld>
             <a:endParaRPr lang="en-US" dirty="0"/>
           </a:p>
@@ -2848,7 +2858,7 @@
           <a:p>
             <a:fld id="{1160EA64-D806-43AC-9DF2-F8C432F32B4C}" type="datetimeFigureOut">
               <a:rPr lang="en-US" smtClean="0"/>
-              <a:t>5/22/2020</a:t>
+              <a:t>5/23/2020</a:t>
             </a:fld>
             <a:endParaRPr lang="en-US" dirty="0"/>
           </a:p>
@@ -3391,6 +3401,394 @@
 </p:sld>
 </file>
 
+<file path=ppt/slides/slide10.xml><?xml version="1.0" encoding="utf-8"?>
+<p:sld xmlns:a="http://schemas.openxmlformats.org/drawingml/2006/main" xmlns:r="http://schemas.openxmlformats.org/officeDocument/2006/relationships" xmlns:p="http://schemas.openxmlformats.org/presentationml/2006/main">
+  <p:cSld>
+    <p:spTree>
+      <p:nvGrpSpPr>
+        <p:cNvPr id="1" name=""/>
+        <p:cNvGrpSpPr/>
+        <p:nvPr/>
+      </p:nvGrpSpPr>
+      <p:grpSpPr>
+        <a:xfrm>
+          <a:off x="0" y="0"/>
+          <a:ext cx="0" cy="0"/>
+          <a:chOff x="0" y="0"/>
+          <a:chExt cx="0" cy="0"/>
+        </a:xfrm>
+      </p:grpSpPr>
+      <p:sp>
+        <p:nvSpPr>
+          <p:cNvPr id="2" name="Title 1">
+            <a:extLst>
+              <a:ext uri="{FF2B5EF4-FFF2-40B4-BE49-F238E27FC236}">
+                <a16:creationId xmlns:a16="http://schemas.microsoft.com/office/drawing/2014/main" id="{0ED3C801-6C96-4123-BDB9-1AD8CF3EC460}"/>
+              </a:ext>
+            </a:extLst>
+          </p:cNvPr>
+          <p:cNvSpPr>
+            <a:spLocks noGrp="1"/>
+          </p:cNvSpPr>
+          <p:nvPr>
+            <p:ph type="title"/>
+          </p:nvPr>
+        </p:nvSpPr>
+        <p:spPr/>
+        <p:txBody>
+          <a:bodyPr/>
+          <a:lstStyle/>
+          <a:p>
+            <a:r>
+              <a:rPr lang="he-IL" dirty="0"/>
+              <a:t>היסטוריה</a:t>
+            </a:r>
+          </a:p>
+        </p:txBody>
+      </p:sp>
+      <p:sp>
+        <p:nvSpPr>
+          <p:cNvPr id="3" name="Content Placeholder 2">
+            <a:extLst>
+              <a:ext uri="{FF2B5EF4-FFF2-40B4-BE49-F238E27FC236}">
+                <a16:creationId xmlns:a16="http://schemas.microsoft.com/office/drawing/2014/main" id="{8DE18717-999B-498B-B6D5-5F0AC39DFDD1}"/>
+              </a:ext>
+            </a:extLst>
+          </p:cNvPr>
+          <p:cNvSpPr>
+            <a:spLocks noGrp="1"/>
+          </p:cNvSpPr>
+          <p:nvPr>
+            <p:ph idx="1"/>
+          </p:nvPr>
+        </p:nvSpPr>
+        <p:spPr>
+          <a:xfrm>
+            <a:off x="2231136" y="2319262"/>
+            <a:ext cx="7729728" cy="3930536"/>
+          </a:xfrm>
+        </p:spPr>
+        <p:txBody>
+          <a:bodyPr>
+            <a:normAutofit lnSpcReduction="10000"/>
+          </a:bodyPr>
+          <a:lstStyle/>
+          <a:p>
+            <a:r>
+              <a:rPr lang="he-IL" dirty="0"/>
+              <a:t>החסם הראשון שאי פעם הוצע לבעיה הוצע על ידי </a:t>
+            </a:r>
+            <a:r>
+              <a:rPr lang="en-US" dirty="0"/>
+              <a:t>László </a:t>
+            </a:r>
+            <a:r>
+              <a:rPr lang="en-US" dirty="0" err="1"/>
+              <a:t>Lovász</a:t>
+            </a:r>
+            <a:r>
+              <a:rPr lang="he-IL" dirty="0"/>
+              <a:t> (מתמטיקאי הונגרי זוכה פרס וולף) ב-1971, בפועל החסם נקבע עבור בעיה שהוכח בהמשך שכל חסם עליה שווה גם לחסם של </a:t>
+            </a:r>
+            <a:r>
+              <a:rPr lang="en-US" dirty="0"/>
+              <a:t>k-sets</a:t>
+            </a:r>
+            <a:r>
+              <a:rPr lang="he-IL" dirty="0"/>
+              <a:t> והיא </a:t>
+            </a:r>
+            <a:r>
+              <a:rPr lang="en-US" dirty="0"/>
+              <a:t>halving lines</a:t>
+            </a:r>
+            <a:r>
+              <a:rPr lang="he-IL" dirty="0"/>
+              <a:t> (עוד על בעיות קשורות בהמשך)</a:t>
+            </a:r>
+          </a:p>
+          <a:p>
+            <a:r>
+              <a:rPr lang="he-IL" dirty="0"/>
+              <a:t>הגדרה: עבור קבוצה </a:t>
+            </a:r>
+            <a:r>
+              <a:rPr lang="en-US" dirty="0"/>
+              <a:t>S</a:t>
+            </a:r>
+            <a:r>
+              <a:rPr lang="he-IL" dirty="0"/>
+              <a:t> בגודל </a:t>
+            </a:r>
+            <a:r>
+              <a:rPr lang="en-US" dirty="0"/>
+              <a:t>n</a:t>
+            </a:r>
+            <a:r>
+              <a:rPr lang="he-IL" dirty="0"/>
+              <a:t> של נקודות במישור </a:t>
+            </a:r>
+            <a:r>
+              <a:rPr lang="en-US" dirty="0"/>
+              <a:t>halving line</a:t>
+            </a:r>
+            <a:r>
+              <a:rPr lang="he-IL" dirty="0"/>
+              <a:t> הוא קטע שעובר בין שני נקודות של </a:t>
+            </a:r>
+            <a:r>
+              <a:rPr lang="en-US" dirty="0"/>
+              <a:t>S</a:t>
+            </a:r>
+            <a:r>
+              <a:rPr lang="he-IL" dirty="0"/>
+              <a:t> ומחלק את קבוצה </a:t>
+            </a:r>
+            <a:r>
+              <a:rPr lang="en-US" dirty="0"/>
+              <a:t>S</a:t>
+            </a:r>
+            <a:r>
+              <a:rPr lang="he-IL" dirty="0"/>
+              <a:t> לשני חלקים שווים.</a:t>
+            </a:r>
+          </a:p>
+          <a:p>
+            <a:r>
+              <a:rPr lang="he-IL" i="1" dirty="0"/>
+              <a:t>כמות </a:t>
+            </a:r>
+            <a:r>
+              <a:rPr lang="en-US" i="1" dirty="0"/>
+              <a:t>halving lines</a:t>
+            </a:r>
+            <a:r>
+              <a:rPr lang="he-IL" i="1" dirty="0"/>
+              <a:t> מקסימלית בקבוצה בגודל </a:t>
+            </a:r>
+            <a:r>
+              <a:rPr lang="en-US" i="1" dirty="0"/>
+              <a:t>n</a:t>
+            </a:r>
+            <a:r>
+              <a:rPr lang="he-IL" i="1" dirty="0"/>
+              <a:t>: </a:t>
+            </a:r>
+            <a:r>
+              <a:rPr lang="en-US" i="1" dirty="0"/>
+              <a:t>O(n</a:t>
+            </a:r>
+            <a:r>
+              <a:rPr lang="en-US" i="1" baseline="30000" dirty="0"/>
+              <a:t>3/2</a:t>
+            </a:r>
+            <a:r>
+              <a:rPr lang="en-US" i="1" dirty="0"/>
+              <a:t>)</a:t>
+            </a:r>
+          </a:p>
+          <a:p>
+            <a:r>
+              <a:rPr lang="he-IL" i="1" dirty="0"/>
+              <a:t>מאוחר יותר, ב1973 </a:t>
+            </a:r>
+            <a:r>
+              <a:rPr lang="en-US" dirty="0"/>
+              <a:t> </a:t>
+            </a:r>
+            <a:r>
+              <a:rPr lang="en-US" dirty="0" err="1"/>
+              <a:t>Erdõs</a:t>
+            </a:r>
+            <a:r>
+              <a:rPr lang="en-US" dirty="0"/>
+              <a:t>, </a:t>
+            </a:r>
+            <a:r>
+              <a:rPr lang="en-US" dirty="0" err="1"/>
+              <a:t>Lovász</a:t>
+            </a:r>
+            <a:r>
+              <a:rPr lang="en-US" dirty="0"/>
+              <a:t>, Simmons</a:t>
+            </a:r>
+            <a:r>
+              <a:rPr lang="he-IL" dirty="0"/>
+              <a:t> ו-</a:t>
+            </a:r>
+            <a:r>
+              <a:rPr lang="en-US" dirty="0"/>
+              <a:t> Strauss </a:t>
+            </a:r>
+            <a:r>
+              <a:rPr lang="he-IL" dirty="0"/>
+              <a:t> שיפרו את החסם עבור </a:t>
+            </a:r>
+            <a:r>
+              <a:rPr lang="en-US" dirty="0"/>
+              <a:t>k-sets</a:t>
+            </a:r>
+            <a:r>
+              <a:rPr lang="he-IL" dirty="0"/>
+              <a:t> לכל מספר </a:t>
+            </a:r>
+            <a:r>
+              <a:rPr lang="en-US" dirty="0"/>
+              <a:t>k</a:t>
+            </a:r>
+            <a:r>
+              <a:rPr lang="he-IL" dirty="0"/>
+              <a:t> ולכל </a:t>
+            </a:r>
+            <a:r>
+              <a:rPr lang="en-US" dirty="0"/>
+              <a:t>n</a:t>
+            </a:r>
+            <a:r>
+              <a:rPr lang="he-IL" dirty="0"/>
+              <a:t> להיות - </a:t>
+            </a:r>
+            <a:r>
+              <a:rPr lang="en-US" i="1" dirty="0"/>
+              <a:t>O(n k</a:t>
+            </a:r>
+            <a:r>
+              <a:rPr lang="en-US" i="1" baseline="30000" dirty="0"/>
+              <a:t>1/2</a:t>
+            </a:r>
+            <a:r>
+              <a:rPr lang="en-US" i="1" dirty="0"/>
+              <a:t>)</a:t>
+            </a:r>
+            <a:r>
+              <a:rPr lang="he-IL" i="1" dirty="0"/>
+              <a:t> – חסם הדוק יותר.</a:t>
+            </a:r>
+          </a:p>
+          <a:p>
+            <a:r>
+              <a:rPr lang="he-IL" i="1" dirty="0"/>
+              <a:t>החסם הנ"ל לא שופר עד 1989 – בה </a:t>
+            </a:r>
+            <a:r>
+              <a:rPr lang="en-US" dirty="0"/>
+              <a:t> </a:t>
+            </a:r>
+            <a:r>
+              <a:rPr lang="en-US" dirty="0" err="1"/>
+              <a:t>Pach</a:t>
+            </a:r>
+            <a:r>
+              <a:rPr lang="en-US" dirty="0"/>
+              <a:t>, </a:t>
+            </a:r>
+            <a:r>
+              <a:rPr lang="en-US" dirty="0" err="1"/>
+              <a:t>Steiger</a:t>
+            </a:r>
+            <a:r>
+              <a:rPr lang="he-IL" dirty="0"/>
+              <a:t> ו-</a:t>
+            </a:r>
+            <a:r>
+              <a:rPr lang="en-US" dirty="0"/>
+              <a:t> </a:t>
+            </a:r>
+            <a:r>
+              <a:rPr lang="en-US" dirty="0" err="1"/>
+              <a:t>Szemerédi</a:t>
+            </a:r>
+            <a:r>
+              <a:rPr lang="en-US" dirty="0"/>
+              <a:t> </a:t>
+            </a:r>
+            <a:r>
+              <a:rPr lang="he-IL" i="1" dirty="0"/>
+              <a:t> הצליחו להדק אותו ל-</a:t>
+            </a:r>
+            <a:r>
+              <a:rPr lang="pt-BR" i="1" dirty="0"/>
+              <a:t> O(n k</a:t>
+            </a:r>
+            <a:r>
+              <a:rPr lang="pt-BR" i="1" baseline="30000" dirty="0"/>
+              <a:t>1/2</a:t>
+            </a:r>
+            <a:r>
+              <a:rPr lang="pt-BR" i="1" dirty="0"/>
+              <a:t> / log</a:t>
+            </a:r>
+            <a:r>
+              <a:rPr lang="pt-BR" i="1" baseline="30000" dirty="0"/>
+              <a:t>*</a:t>
+            </a:r>
+            <a:r>
+              <a:rPr lang="pt-BR" i="1" dirty="0"/>
+              <a:t>n)</a:t>
+            </a:r>
+            <a:r>
+              <a:rPr lang="he-IL" i="1" dirty="0"/>
+              <a:t> – לא שיפור גדול כ"כ ביחס ל16 שנים</a:t>
+            </a:r>
+          </a:p>
+          <a:p>
+            <a:r>
+              <a:rPr lang="he-IL" i="1" dirty="0"/>
+              <a:t>המאמר שלנו מדבר על החסם הטוב ביותר שקיים עד היום </a:t>
+            </a:r>
+            <a:r>
+              <a:rPr lang="en-US" i="1" dirty="0"/>
+              <a:t>O</a:t>
+            </a:r>
+            <a:r>
+              <a:rPr lang="en-US" dirty="0"/>
+              <a:t>(</a:t>
+            </a:r>
+            <a:r>
+              <a:rPr lang="en-US" i="1" dirty="0"/>
+              <a:t>nk</a:t>
+            </a:r>
+            <a:r>
+              <a:rPr lang="en-US" baseline="30000" dirty="0"/>
+              <a:t>1/3</a:t>
+            </a:r>
+            <a:r>
+              <a:rPr lang="en-US" dirty="0"/>
+              <a:t>)</a:t>
+            </a:r>
+            <a:r>
+              <a:rPr lang="he-IL" dirty="0"/>
+              <a:t>- הוכח בשנת 1998 ע"י </a:t>
+            </a:r>
+            <a:r>
+              <a:rPr lang="en-US" b="1" dirty="0" err="1"/>
+              <a:t>Tamal</a:t>
+            </a:r>
+            <a:r>
+              <a:rPr lang="en-US" b="1" dirty="0"/>
+              <a:t> Krishna Dey</a:t>
+            </a:r>
+            <a:r>
+              <a:rPr lang="he-IL" b="1" dirty="0"/>
+              <a:t> פרופ' למדעי המחשב באונ' אוהיו.</a:t>
+            </a:r>
+            <a:endParaRPr lang="he-IL" dirty="0"/>
+          </a:p>
+        </p:txBody>
+      </p:sp>
+    </p:spTree>
+    <p:extLst>
+      <p:ext uri="{BB962C8B-B14F-4D97-AF65-F5344CB8AC3E}">
+        <p14:creationId xmlns:p14="http://schemas.microsoft.com/office/powerpoint/2010/main" val="1346651604"/>
+      </p:ext>
+    </p:extLst>
+  </p:cSld>
+  <p:clrMapOvr>
+    <a:masterClrMapping/>
+  </p:clrMapOvr>
+</p:sld>
+</file>
+
 <file path=ppt/slides/slide2.xml><?xml version="1.0" encoding="utf-8"?>
 <p:sld xmlns:a="http://schemas.openxmlformats.org/drawingml/2006/main" xmlns:r="http://schemas.openxmlformats.org/officeDocument/2006/relationships" xmlns:p="http://schemas.openxmlformats.org/presentationml/2006/main">
   <p:cSld>
@@ -4267,6 +4665,618 @@
     <p:extLst>
       <p:ext uri="{BB962C8B-B14F-4D97-AF65-F5344CB8AC3E}">
         <p14:creationId xmlns:p14="http://schemas.microsoft.com/office/powerpoint/2010/main" val="988722138"/>
+      </p:ext>
+    </p:extLst>
+  </p:cSld>
+  <p:clrMapOvr>
+    <a:masterClrMapping/>
+  </p:clrMapOvr>
+</p:sld>
+</file>
+
+<file path=ppt/slides/slide6.xml><?xml version="1.0" encoding="utf-8"?>
+<p:sld xmlns:a="http://schemas.openxmlformats.org/drawingml/2006/main" xmlns:r="http://schemas.openxmlformats.org/officeDocument/2006/relationships" xmlns:p="http://schemas.openxmlformats.org/presentationml/2006/main">
+  <p:cSld>
+    <p:spTree>
+      <p:nvGrpSpPr>
+        <p:cNvPr id="1" name=""/>
+        <p:cNvGrpSpPr/>
+        <p:nvPr/>
+      </p:nvGrpSpPr>
+      <p:grpSpPr>
+        <a:xfrm>
+          <a:off x="0" y="0"/>
+          <a:ext cx="0" cy="0"/>
+          <a:chOff x="0" y="0"/>
+          <a:chExt cx="0" cy="0"/>
+        </a:xfrm>
+      </p:grpSpPr>
+      <p:sp>
+        <p:nvSpPr>
+          <p:cNvPr id="2" name="Title 1">
+            <a:extLst>
+              <a:ext uri="{FF2B5EF4-FFF2-40B4-BE49-F238E27FC236}">
+                <a16:creationId xmlns:a16="http://schemas.microsoft.com/office/drawing/2014/main" id="{900EFF28-9C18-42A7-AB5D-14D8D378B85D}"/>
+              </a:ext>
+            </a:extLst>
+          </p:cNvPr>
+          <p:cNvSpPr>
+            <a:spLocks noGrp="1"/>
+          </p:cNvSpPr>
+          <p:nvPr>
+            <p:ph type="title"/>
+          </p:nvPr>
+        </p:nvSpPr>
+        <p:spPr/>
+        <p:txBody>
+          <a:bodyPr/>
+          <a:lstStyle/>
+          <a:p>
+            <a:r>
+              <a:rPr lang="he-IL" dirty="0"/>
+              <a:t>מה אנחנו מנסים לעשות?</a:t>
+            </a:r>
+          </a:p>
+        </p:txBody>
+      </p:sp>
+      <p:sp>
+        <p:nvSpPr>
+          <p:cNvPr id="3" name="Content Placeholder 2">
+            <a:extLst>
+              <a:ext uri="{FF2B5EF4-FFF2-40B4-BE49-F238E27FC236}">
+                <a16:creationId xmlns:a16="http://schemas.microsoft.com/office/drawing/2014/main" id="{B74336F3-2439-4757-BB68-406D7857FFF6}"/>
+              </a:ext>
+            </a:extLst>
+          </p:cNvPr>
+          <p:cNvSpPr>
+            <a:spLocks noGrp="1"/>
+          </p:cNvSpPr>
+          <p:nvPr>
+            <p:ph idx="1"/>
+          </p:nvPr>
+        </p:nvSpPr>
+        <p:spPr/>
+        <p:txBody>
+          <a:bodyPr/>
+          <a:lstStyle/>
+          <a:p>
+            <a:r>
+              <a:rPr lang="he-IL" dirty="0"/>
+              <a:t>אנחנו מתעניינים בחסם עליון על כמות ה</a:t>
+            </a:r>
+            <a:r>
+              <a:rPr lang="en-US" dirty="0"/>
+              <a:t>k-sets</a:t>
+            </a:r>
+            <a:r>
+              <a:rPr lang="he-IL" dirty="0"/>
+              <a:t> שיש בקבוצת נקודות כלשהי </a:t>
+            </a:r>
+            <a:r>
+              <a:rPr lang="en-US" dirty="0"/>
+              <a:t> P</a:t>
+            </a:r>
+            <a:r>
+              <a:rPr lang="he-IL" dirty="0"/>
+              <a:t> כפונקציה של</a:t>
+            </a:r>
+            <a:r>
+              <a:rPr lang="en-US" dirty="0"/>
+              <a:t>:</a:t>
+            </a:r>
+            <a:r>
+              <a:rPr lang="he-IL" dirty="0"/>
+              <a:t> </a:t>
+            </a:r>
+            <a:r>
+              <a:rPr lang="en-US" dirty="0"/>
+              <a:t>k</a:t>
+            </a:r>
+            <a:r>
+              <a:rPr lang="he-IL" dirty="0"/>
+              <a:t> – גודל קבוצת הנקודות שצריך להפריד ושל </a:t>
+            </a:r>
+            <a:r>
+              <a:rPr lang="en-US" dirty="0"/>
+              <a:t>n</a:t>
+            </a:r>
+            <a:r>
+              <a:rPr lang="he-IL" dirty="0"/>
+              <a:t> – גודל </a:t>
+            </a:r>
+            <a:r>
+              <a:rPr lang="en-US" dirty="0"/>
+              <a:t>P</a:t>
+            </a:r>
+            <a:endParaRPr lang="he-IL" dirty="0"/>
+          </a:p>
+          <a:p>
+            <a:endParaRPr lang="he-IL" dirty="0"/>
+          </a:p>
+          <a:p>
+            <a:r>
+              <a:rPr lang="he-IL" dirty="0"/>
+              <a:t>מה זה אומר "כמות ה</a:t>
+            </a:r>
+            <a:r>
+              <a:rPr lang="en-US" dirty="0"/>
+              <a:t>k-sets</a:t>
+            </a:r>
+            <a:r>
+              <a:rPr lang="he-IL" dirty="0"/>
+              <a:t>"? כמות תת הקבוצות השונות של </a:t>
+            </a:r>
+            <a:r>
+              <a:rPr lang="en-US" dirty="0"/>
+              <a:t>P</a:t>
+            </a:r>
+            <a:r>
+              <a:rPr lang="he-IL" dirty="0"/>
+              <a:t> בגודל </a:t>
+            </a:r>
+            <a:r>
+              <a:rPr lang="en-US" dirty="0"/>
+              <a:t>k</a:t>
+            </a:r>
+            <a:r>
+              <a:rPr lang="he-IL" dirty="0"/>
+              <a:t> – שניתן להפריד משאר הקבוצה ע"י ישר – את הכמות הזו נרצה לחסום מלמעלה.</a:t>
+            </a:r>
+          </a:p>
+          <a:p>
+            <a:endParaRPr lang="he-IL" dirty="0"/>
+          </a:p>
+          <a:p>
+            <a:endParaRPr lang="he-IL" dirty="0"/>
+          </a:p>
+        </p:txBody>
+      </p:sp>
+    </p:spTree>
+    <p:extLst>
+      <p:ext uri="{BB962C8B-B14F-4D97-AF65-F5344CB8AC3E}">
+        <p14:creationId xmlns:p14="http://schemas.microsoft.com/office/powerpoint/2010/main" val="692940599"/>
+      </p:ext>
+    </p:extLst>
+  </p:cSld>
+  <p:clrMapOvr>
+    <a:masterClrMapping/>
+  </p:clrMapOvr>
+</p:sld>
+</file>
+
+<file path=ppt/slides/slide7.xml><?xml version="1.0" encoding="utf-8"?>
+<p:sld xmlns:a="http://schemas.openxmlformats.org/drawingml/2006/main" xmlns:r="http://schemas.openxmlformats.org/officeDocument/2006/relationships" xmlns:p="http://schemas.openxmlformats.org/presentationml/2006/main">
+  <p:cSld>
+    <p:spTree>
+      <p:nvGrpSpPr>
+        <p:cNvPr id="1" name=""/>
+        <p:cNvGrpSpPr/>
+        <p:nvPr/>
+      </p:nvGrpSpPr>
+      <p:grpSpPr>
+        <a:xfrm>
+          <a:off x="0" y="0"/>
+          <a:ext cx="0" cy="0"/>
+          <a:chOff x="0" y="0"/>
+          <a:chExt cx="0" cy="0"/>
+        </a:xfrm>
+      </p:grpSpPr>
+      <p:sp>
+        <p:nvSpPr>
+          <p:cNvPr id="2" name="Title 1">
+            <a:extLst>
+              <a:ext uri="{FF2B5EF4-FFF2-40B4-BE49-F238E27FC236}">
+                <a16:creationId xmlns:a16="http://schemas.microsoft.com/office/drawing/2014/main" id="{7D95CD0B-61AB-448A-A746-FC6D99735868}"/>
+              </a:ext>
+            </a:extLst>
+          </p:cNvPr>
+          <p:cNvSpPr>
+            <a:spLocks noGrp="1"/>
+          </p:cNvSpPr>
+          <p:nvPr>
+            <p:ph type="title"/>
+          </p:nvPr>
+        </p:nvSpPr>
+        <p:spPr/>
+        <p:txBody>
+          <a:bodyPr/>
+          <a:lstStyle/>
+          <a:p>
+            <a:r>
+              <a:rPr lang="he-IL" dirty="0"/>
+              <a:t>מה מעניין ב</a:t>
+            </a:r>
+            <a:r>
+              <a:rPr lang="en-US" dirty="0"/>
+              <a:t>K-SETS</a:t>
+            </a:r>
+            <a:r>
+              <a:rPr lang="he-IL" dirty="0"/>
+              <a:t> ?</a:t>
+            </a:r>
+          </a:p>
+        </p:txBody>
+      </p:sp>
+      <p:sp>
+        <p:nvSpPr>
+          <p:cNvPr id="3" name="Content Placeholder 2">
+            <a:extLst>
+              <a:ext uri="{FF2B5EF4-FFF2-40B4-BE49-F238E27FC236}">
+                <a16:creationId xmlns:a16="http://schemas.microsoft.com/office/drawing/2014/main" id="{0CA7BF0B-8B23-45E6-9D6E-AD7D18561296}"/>
+              </a:ext>
+            </a:extLst>
+          </p:cNvPr>
+          <p:cNvSpPr>
+            <a:spLocks noGrp="1"/>
+          </p:cNvSpPr>
+          <p:nvPr>
+            <p:ph idx="1"/>
+          </p:nvPr>
+        </p:nvSpPr>
+        <p:spPr/>
+        <p:txBody>
+          <a:bodyPr>
+            <a:normAutofit lnSpcReduction="10000"/>
+          </a:bodyPr>
+          <a:lstStyle/>
+          <a:p>
+            <a:r>
+              <a:rPr lang="he-IL" dirty="0"/>
+              <a:t>ראשית, נתינת חסם עליון הדוק ביותר לכמות ה</a:t>
+            </a:r>
+            <a:r>
+              <a:rPr lang="en-US" dirty="0"/>
+              <a:t>K-SETS</a:t>
+            </a:r>
+            <a:r>
+              <a:rPr lang="he-IL" dirty="0"/>
+              <a:t> על כל קבוצה של </a:t>
+            </a:r>
+            <a:r>
+              <a:rPr lang="en-US" dirty="0"/>
+              <a:t>n</a:t>
+            </a:r>
+            <a:r>
+              <a:rPr lang="he-IL" dirty="0"/>
+              <a:t> נ"ק במישור היא בעיה קומבינטורית פתוחה, כלומר מאז</a:t>
+            </a:r>
+            <a:r>
+              <a:rPr lang="en-US" dirty="0"/>
+              <a:t> </a:t>
+            </a:r>
+            <a:r>
+              <a:rPr lang="he-IL" dirty="0"/>
+              <a:t>1998 השנה בה הוכח החסם ההדוק ביותר – החסם שאנחנו מציגים, לא ניתן חסם הדוק יותר ולא הוכח שהחסם הנ"ל הוא ההדוק ביותר האפשרי, בנוסף, עבור </a:t>
+            </a:r>
+            <a:r>
+              <a:rPr lang="en-US" dirty="0"/>
+              <a:t>K-SETS</a:t>
+            </a:r>
+            <a:r>
+              <a:rPr lang="he-IL" dirty="0"/>
+              <a:t> במרחב יותר מדו מימדי, אין כמעט התקדמות בנושא, כלומר קשה מאד להוכיח חסמים עבור הבעיה – מה שכבר הופך אותה למעניינת</a:t>
+            </a:r>
+          </a:p>
+          <a:p>
+            <a:r>
+              <a:rPr lang="he-IL" dirty="0"/>
+              <a:t>לחסם עליון הדוק על כמות </a:t>
+            </a:r>
+            <a:r>
+              <a:rPr lang="en-US" dirty="0"/>
+              <a:t>K-SETS</a:t>
+            </a:r>
+            <a:r>
+              <a:rPr lang="he-IL" dirty="0"/>
+              <a:t> יש השפעה על ניתוח של אלגורתמים גאומטריים רבים – למשל </a:t>
+            </a:r>
+            <a:r>
+              <a:rPr lang="en-US" dirty="0"/>
+              <a:t>Half-space range search</a:t>
+            </a:r>
+            <a:r>
+              <a:rPr lang="he-IL" dirty="0"/>
+              <a:t> (ועוד רבים אחרים)</a:t>
+            </a:r>
+          </a:p>
+          <a:p>
+            <a:r>
+              <a:rPr lang="en-US" dirty="0"/>
+              <a:t>K-SETS</a:t>
+            </a:r>
+            <a:r>
+              <a:rPr lang="he-IL" dirty="0"/>
+              <a:t> מקיימים "דואליוט" (דימיון, סימטריה) עם בעיות אחרות כמו</a:t>
+            </a:r>
+          </a:p>
+          <a:p>
+            <a:pPr marL="0" indent="0">
+              <a:buNone/>
+            </a:pPr>
+            <a:r>
+              <a:rPr lang="en-US" dirty="0"/>
+              <a:t>k-level line arrangement</a:t>
+            </a:r>
+            <a:endParaRPr lang="he-IL" dirty="0"/>
+          </a:p>
+        </p:txBody>
+      </p:sp>
+    </p:spTree>
+    <p:extLst>
+      <p:ext uri="{BB962C8B-B14F-4D97-AF65-F5344CB8AC3E}">
+        <p14:creationId xmlns:p14="http://schemas.microsoft.com/office/powerpoint/2010/main" val="304772737"/>
+      </p:ext>
+    </p:extLst>
+  </p:cSld>
+  <p:clrMapOvr>
+    <a:masterClrMapping/>
+  </p:clrMapOvr>
+</p:sld>
+</file>
+
+<file path=ppt/slides/slide8.xml><?xml version="1.0" encoding="utf-8"?>
+<p:sld xmlns:a="http://schemas.openxmlformats.org/drawingml/2006/main" xmlns:r="http://schemas.openxmlformats.org/officeDocument/2006/relationships" xmlns:p="http://schemas.openxmlformats.org/presentationml/2006/main">
+  <p:cSld>
+    <p:spTree>
+      <p:nvGrpSpPr>
+        <p:cNvPr id="1" name=""/>
+        <p:cNvGrpSpPr/>
+        <p:nvPr/>
+      </p:nvGrpSpPr>
+      <p:grpSpPr>
+        <a:xfrm>
+          <a:off x="0" y="0"/>
+          <a:ext cx="0" cy="0"/>
+          <a:chOff x="0" y="0"/>
+          <a:chExt cx="0" cy="0"/>
+        </a:xfrm>
+      </p:grpSpPr>
+      <p:sp>
+        <p:nvSpPr>
+          <p:cNvPr id="2" name="Title 1">
+            <a:extLst>
+              <a:ext uri="{FF2B5EF4-FFF2-40B4-BE49-F238E27FC236}">
+                <a16:creationId xmlns:a16="http://schemas.microsoft.com/office/drawing/2014/main" id="{A45267BD-DC07-4513-87D0-485A25F5632F}"/>
+              </a:ext>
+            </a:extLst>
+          </p:cNvPr>
+          <p:cNvSpPr>
+            <a:spLocks noGrp="1"/>
+          </p:cNvSpPr>
+          <p:nvPr>
+            <p:ph type="title"/>
+          </p:nvPr>
+        </p:nvSpPr>
+        <p:spPr/>
+        <p:txBody>
+          <a:bodyPr/>
+          <a:lstStyle/>
+          <a:p>
+            <a:r>
+              <a:rPr lang="he-IL" dirty="0"/>
+              <a:t>בעיות קשורות ואפליקציות של </a:t>
+            </a:r>
+            <a:r>
+              <a:rPr lang="en-US" dirty="0"/>
+              <a:t>  (1)K-SETS</a:t>
+            </a:r>
+            <a:endParaRPr lang="he-IL" dirty="0"/>
+          </a:p>
+        </p:txBody>
+      </p:sp>
+      <p:sp>
+        <p:nvSpPr>
+          <p:cNvPr id="3" name="Content Placeholder 2">
+            <a:extLst>
+              <a:ext uri="{FF2B5EF4-FFF2-40B4-BE49-F238E27FC236}">
+                <a16:creationId xmlns:a16="http://schemas.microsoft.com/office/drawing/2014/main" id="{46B19D31-3589-487D-84A7-7DA85A7B697D}"/>
+              </a:ext>
+            </a:extLst>
+          </p:cNvPr>
+          <p:cNvSpPr>
+            <a:spLocks noGrp="1"/>
+          </p:cNvSpPr>
+          <p:nvPr>
+            <p:ph idx="1"/>
+          </p:nvPr>
+        </p:nvSpPr>
+        <p:spPr/>
+        <p:txBody>
+          <a:bodyPr/>
+          <a:lstStyle/>
+          <a:p>
+            <a:r>
+              <a:rPr lang="he-IL" dirty="0"/>
+              <a:t>ע"מ להסביר כיצד בעיות גאו' אחרות קשורות לבעיה המתוארת, נצטרך להציג את מושג ה-</a:t>
+            </a:r>
+            <a:r>
+              <a:rPr lang="en-US" dirty="0"/>
+              <a:t>Duality</a:t>
+            </a:r>
+          </a:p>
+          <a:p>
+            <a:r>
+              <a:rPr lang="he-IL" dirty="0"/>
+              <a:t>באופן כללי, ברמה המתמטית הכללית (ולא בעולם של גאו' בהכרח) </a:t>
+            </a:r>
+            <a:r>
+              <a:rPr lang="en-US" dirty="0"/>
+              <a:t>Duality</a:t>
+            </a:r>
+            <a:r>
+              <a:rPr lang="he-IL" dirty="0"/>
+              <a:t> הוא הרעיון של "להמיר" קונספטים, משפטים ומבנים מתמטיים לקונספטים, משפטים ומבנים שונים מהם, בצורה חח"ע, בגאו' – בעיקר ב</a:t>
+            </a:r>
+            <a:r>
+              <a:rPr lang="he-IL" b="1" dirty="0"/>
+              <a:t>מישורים פרויקטיבים, דואליות היא היכולת למפות נקודות לישרים וישירם לנקודות – בין שני מרחבים של בעיות שונות ע"י פונ חח"ע, דוגמא לפונ כזו בכיוון שמנקודות לישירים היא: כל נקודה (</a:t>
+            </a:r>
+            <a:r>
+              <a:rPr lang="en-US" b="1" dirty="0" err="1"/>
+              <a:t>a,b</a:t>
+            </a:r>
+            <a:r>
+              <a:rPr lang="he-IL" b="1" dirty="0"/>
+              <a:t>) נמפה לישר </a:t>
+            </a:r>
+            <a:r>
+              <a:rPr lang="en-US" b="1" dirty="0"/>
+              <a:t>y=ax-b</a:t>
+            </a:r>
+            <a:r>
+              <a:rPr lang="he-IL" b="1" dirty="0"/>
+              <a:t>, בשביל לעבור מישרים לנקודות נפעיל את הפונ ההפוכה, מ-</a:t>
+            </a:r>
+            <a:r>
+              <a:rPr lang="en-US" b="1" dirty="0"/>
+              <a:t> y=ax-b</a:t>
+            </a:r>
+            <a:r>
+              <a:rPr lang="he-IL" b="1" dirty="0"/>
+              <a:t> ל- (</a:t>
+            </a:r>
+            <a:r>
+              <a:rPr lang="en-US" b="1" dirty="0" err="1"/>
+              <a:t>a,b</a:t>
+            </a:r>
+            <a:r>
+              <a:rPr lang="he-IL" b="1" dirty="0"/>
+              <a:t>).</a:t>
+            </a:r>
+            <a:endParaRPr lang="he-IL" dirty="0"/>
+          </a:p>
+          <a:p>
+            <a:endParaRPr lang="he-IL" dirty="0"/>
+          </a:p>
+        </p:txBody>
+      </p:sp>
+    </p:spTree>
+    <p:extLst>
+      <p:ext uri="{BB962C8B-B14F-4D97-AF65-F5344CB8AC3E}">
+        <p14:creationId xmlns:p14="http://schemas.microsoft.com/office/powerpoint/2010/main" val="2371396916"/>
+      </p:ext>
+    </p:extLst>
+  </p:cSld>
+  <p:clrMapOvr>
+    <a:masterClrMapping/>
+  </p:clrMapOvr>
+</p:sld>
+</file>
+
+<file path=ppt/slides/slide9.xml><?xml version="1.0" encoding="utf-8"?>
+<p:sld xmlns:a="http://schemas.openxmlformats.org/drawingml/2006/main" xmlns:r="http://schemas.openxmlformats.org/officeDocument/2006/relationships" xmlns:p="http://schemas.openxmlformats.org/presentationml/2006/main">
+  <p:cSld>
+    <p:spTree>
+      <p:nvGrpSpPr>
+        <p:cNvPr id="1" name=""/>
+        <p:cNvGrpSpPr/>
+        <p:nvPr/>
+      </p:nvGrpSpPr>
+      <p:grpSpPr>
+        <a:xfrm>
+          <a:off x="0" y="0"/>
+          <a:ext cx="0" cy="0"/>
+          <a:chOff x="0" y="0"/>
+          <a:chExt cx="0" cy="0"/>
+        </a:xfrm>
+      </p:grpSpPr>
+      <p:sp>
+        <p:nvSpPr>
+          <p:cNvPr id="2" name="Title 1">
+            <a:extLst>
+              <a:ext uri="{FF2B5EF4-FFF2-40B4-BE49-F238E27FC236}">
+                <a16:creationId xmlns:a16="http://schemas.microsoft.com/office/drawing/2014/main" id="{3B221E8D-B790-422D-8EF1-9617095647D6}"/>
+              </a:ext>
+            </a:extLst>
+          </p:cNvPr>
+          <p:cNvSpPr>
+            <a:spLocks noGrp="1"/>
+          </p:cNvSpPr>
+          <p:nvPr>
+            <p:ph type="title"/>
+          </p:nvPr>
+        </p:nvSpPr>
+        <p:spPr/>
+        <p:txBody>
+          <a:bodyPr/>
+          <a:lstStyle/>
+          <a:p>
+            <a:r>
+              <a:rPr lang="he-IL" dirty="0"/>
+              <a:t>בעיות קשורות ואפליקציות של </a:t>
+            </a:r>
+            <a:r>
+              <a:rPr lang="en-US" dirty="0"/>
+              <a:t>  (2)K-SETS</a:t>
+            </a:r>
+            <a:endParaRPr lang="he-IL" dirty="0"/>
+          </a:p>
+        </p:txBody>
+      </p:sp>
+      <p:sp>
+        <p:nvSpPr>
+          <p:cNvPr id="3" name="Content Placeholder 2">
+            <a:extLst>
+              <a:ext uri="{FF2B5EF4-FFF2-40B4-BE49-F238E27FC236}">
+                <a16:creationId xmlns:a16="http://schemas.microsoft.com/office/drawing/2014/main" id="{1D1C6748-7F69-4891-83A4-CD2F70205774}"/>
+              </a:ext>
+            </a:extLst>
+          </p:cNvPr>
+          <p:cNvSpPr>
+            <a:spLocks noGrp="1"/>
+          </p:cNvSpPr>
+          <p:nvPr>
+            <p:ph idx="1"/>
+          </p:nvPr>
+        </p:nvSpPr>
+        <p:spPr/>
+        <p:txBody>
+          <a:bodyPr/>
+          <a:lstStyle/>
+          <a:p>
+            <a:r>
+              <a:rPr lang="he-IL" dirty="0"/>
+              <a:t>ע"י שימוש בפונ' ההמרה הדואליט שהראינו בשקף הקודם, נוכל להמיר את בעיית ה</a:t>
+            </a:r>
+            <a:r>
+              <a:rPr lang="en-US" dirty="0"/>
+              <a:t>K-SETS</a:t>
+            </a:r>
+            <a:r>
+              <a:rPr lang="he-IL" dirty="0"/>
+              <a:t> לבעיית ה</a:t>
+            </a:r>
+            <a:r>
+              <a:rPr lang="en-US" dirty="0"/>
+              <a:t>K-LEVELS</a:t>
+            </a:r>
+            <a:endParaRPr lang="he-IL" dirty="0"/>
+          </a:p>
+          <a:p>
+            <a:r>
+              <a:rPr lang="he-IL" dirty="0"/>
+              <a:t>הגדרה: קבוצת כל הנקודות על ישרים נתונים שיש להם בדיוק </a:t>
+            </a:r>
+            <a:r>
+              <a:rPr lang="en-US" dirty="0"/>
+              <a:t>K</a:t>
+            </a:r>
+            <a:r>
+              <a:rPr lang="he-IL" dirty="0"/>
+              <a:t> </a:t>
+            </a:r>
+            <a:r>
+              <a:rPr lang="he-IL"/>
+              <a:t>ישרים מתחתיהם </a:t>
+            </a:r>
+            <a:endParaRPr lang="he-IL" dirty="0"/>
+          </a:p>
+        </p:txBody>
+      </p:sp>
+    </p:spTree>
+    <p:extLst>
+      <p:ext uri="{BB962C8B-B14F-4D97-AF65-F5344CB8AC3E}">
+        <p14:creationId xmlns:p14="http://schemas.microsoft.com/office/powerpoint/2010/main" val="223484381"/>
       </p:ext>
     </p:extLst>
   </p:cSld>

</xml_diff>

<commit_message>
part A of pres is almost finished
</commit_message>
<xml_diff>
--- a/first part/Improved bounds for planar k-sets.pptx
+++ b/first part/Improved bounds for planar k-sets.pptx
@@ -19,17 +19,20 @@
     <p:sldId id="278" r:id="rId13"/>
     <p:sldId id="279" r:id="rId14"/>
     <p:sldId id="280" r:id="rId15"/>
-    <p:sldId id="262" r:id="rId16"/>
-    <p:sldId id="266" r:id="rId17"/>
-    <p:sldId id="267" r:id="rId18"/>
-    <p:sldId id="268" r:id="rId19"/>
-    <p:sldId id="269" r:id="rId20"/>
-    <p:sldId id="270" r:id="rId21"/>
-    <p:sldId id="271" r:id="rId22"/>
-    <p:sldId id="272" r:id="rId23"/>
-    <p:sldId id="273" r:id="rId24"/>
-    <p:sldId id="275" r:id="rId25"/>
-    <p:sldId id="274" r:id="rId26"/>
+    <p:sldId id="281" r:id="rId16"/>
+    <p:sldId id="282" r:id="rId17"/>
+    <p:sldId id="283" r:id="rId18"/>
+    <p:sldId id="262" r:id="rId19"/>
+    <p:sldId id="266" r:id="rId20"/>
+    <p:sldId id="267" r:id="rId21"/>
+    <p:sldId id="268" r:id="rId22"/>
+    <p:sldId id="269" r:id="rId23"/>
+    <p:sldId id="270" r:id="rId24"/>
+    <p:sldId id="271" r:id="rId25"/>
+    <p:sldId id="272" r:id="rId26"/>
+    <p:sldId id="273" r:id="rId27"/>
+    <p:sldId id="275" r:id="rId28"/>
+    <p:sldId id="274" r:id="rId29"/>
   </p:sldIdLst>
   <p:sldSz cx="12192000" cy="6858000"/>
   <p:notesSz cx="6858000" cy="9144000"/>
@@ -3765,7 +3768,7 @@
           <a:p>
             <a:r>
               <a:rPr lang="he-IL" dirty="0"/>
-              <a:t>ע"י שימוש בפונ' ההמרה הדואלית שהראינו בשקף הקודם, נוכל להמיר את בעיית ה</a:t>
+              <a:t>ע"י שימוש בפונ' המיפוי הדואלי בין נקודות לישירים (הנפוך) שהראינו בשקף הקודם, נוכל להמיר את בעיית ה</a:t>
             </a:r>
             <a:r>
               <a:rPr lang="en-US" dirty="0"/>
@@ -3971,7 +3974,10 @@
           <a:bodyPr/>
           <a:lstStyle/>
           <a:p>
-            <a:endParaRPr lang="he-IL" dirty="0"/>
+            <a:r>
+              <a:rPr lang="he-IL" dirty="0"/>
+              <a:t>להבין את החרא הזה שאלוהים יקח אותי</a:t>
+            </a:r>
           </a:p>
         </p:txBody>
       </p:sp>
@@ -4378,7 +4384,7 @@
             </a:r>
             <a:r>
               <a:rPr lang="he-IL" dirty="0"/>
-              <a:t> מצולעים קמורים, הצלעות שלהם לא נחתכות והם מורכבים מ</a:t>
+              <a:t> מצולעים קמורים, שהצלעות שלהם לא חופפות והם מורכבים מ</a:t>
             </a:r>
             <a:r>
               <a:rPr lang="en-US" dirty="0"/>
@@ -4494,7 +4500,7 @@
           <p:cNvPr id="2" name="Title 1">
             <a:extLst>
               <a:ext uri="{FF2B5EF4-FFF2-40B4-BE49-F238E27FC236}">
-                <a16:creationId xmlns:a16="http://schemas.microsoft.com/office/drawing/2014/main" id="{0ED3C801-6C96-4123-BDB9-1AD8CF3EC460}"/>
+                <a16:creationId xmlns:a16="http://schemas.microsoft.com/office/drawing/2014/main" id="{B67B127D-9304-4565-8E80-919F8E477D19}"/>
               </a:ext>
             </a:extLst>
           </p:cNvPr>
@@ -4505,15 +4511,41 @@
             <p:ph type="title"/>
           </p:nvPr>
         </p:nvSpPr>
-        <p:spPr/>
-        <p:txBody>
-          <a:bodyPr/>
-          <a:lstStyle/>
-          <a:p>
-            <a:r>
-              <a:rPr lang="he-IL" dirty="0"/>
-              <a:t>היסטוריה</a:t>
-            </a:r>
+        <p:spPr>
+          <a:xfrm>
+            <a:off x="2231136" y="192947"/>
+            <a:ext cx="7729728" cy="1650073"/>
+          </a:xfrm>
+        </p:spPr>
+        <p:txBody>
+          <a:bodyPr>
+            <a:normAutofit fontScale="90000"/>
+          </a:bodyPr>
+          <a:lstStyle/>
+          <a:p>
+            <a:r>
+              <a:rPr lang="he-IL" dirty="0"/>
+              <a:t>בעיות קשורות ואפליקציות של </a:t>
+            </a:r>
+            <a:r>
+              <a:rPr lang="en-US" dirty="0"/>
+              <a:t>  </a:t>
+            </a:r>
+            <a:br>
+              <a:rPr lang="en-US" dirty="0"/>
+            </a:br>
+            <a:r>
+              <a:rPr lang="en-US" dirty="0"/>
+              <a:t>:K-SETS</a:t>
+            </a:r>
+            <a:br>
+              <a:rPr lang="en-US" dirty="0"/>
+            </a:br>
+            <a:r>
+              <a:rPr lang="en-US" dirty="0"/>
+              <a:t>Convex Polygons and Matroid Optimization</a:t>
+            </a:r>
+            <a:endParaRPr lang="he-IL" dirty="0"/>
           </a:p>
         </p:txBody>
       </p:sp>
@@ -4522,7 +4554,7 @@
           <p:cNvPr id="3" name="Content Placeholder 2">
             <a:extLst>
               <a:ext uri="{FF2B5EF4-FFF2-40B4-BE49-F238E27FC236}">
-                <a16:creationId xmlns:a16="http://schemas.microsoft.com/office/drawing/2014/main" id="{8DE18717-999B-498B-B6D5-5F0AC39DFDD1}"/>
+                <a16:creationId xmlns:a16="http://schemas.microsoft.com/office/drawing/2014/main" id="{1E455BB2-45DE-490F-B790-912EC9EF6271}"/>
               </a:ext>
             </a:extLst>
           </p:cNvPr>
@@ -4533,324 +4565,153 @@
             <p:ph idx="1"/>
           </p:nvPr>
         </p:nvSpPr>
+        <p:spPr/>
+        <p:txBody>
+          <a:bodyPr/>
+          <a:lstStyle/>
+          <a:p>
+            <a:r>
+              <a:rPr lang="he-IL" dirty="0"/>
+              <a:t>נגדיר את </a:t>
+            </a:r>
+            <a:r>
+              <a:rPr lang="he-IL" u="sng" dirty="0"/>
+              <a:t>הסיבוכיות</a:t>
+            </a:r>
+            <a:r>
+              <a:rPr lang="he-IL" dirty="0"/>
+              <a:t> של המצולעים האלו להיות כמות </a:t>
+            </a:r>
+            <a:r>
+              <a:rPr lang="he-IL" u="sng" dirty="0"/>
+              <a:t>הקודקודים</a:t>
+            </a:r>
+            <a:r>
+              <a:rPr lang="he-IL" dirty="0"/>
+              <a:t> שיש לכלל המצולעים בסה"כ, אם המצולעים זרים "מבפנים", כלומר מבחינת ה-"ביפנוכו" שלהם, כפי שהדגמנו בשקף הקודם – ידוע חסם אופטימלי של </a:t>
+            </a:r>
+            <a:r>
+              <a:rPr lang="el-GR" dirty="0"/>
+              <a:t>  Θ</a:t>
+            </a:r>
+            <a:r>
+              <a:rPr lang="en-US" dirty="0"/>
+              <a:t>(n^{2/3}k^{2/3} + n)</a:t>
+            </a:r>
+            <a:r>
+              <a:rPr lang="he-IL" dirty="0"/>
+              <a:t>(שוב, </a:t>
+            </a:r>
+            <a:r>
+              <a:rPr lang="en-US" dirty="0"/>
+              <a:t>n</a:t>
+            </a:r>
+            <a:r>
+              <a:rPr lang="he-IL" dirty="0"/>
+              <a:t> – כמות קטעים מהם מורכב כל מצולע, </a:t>
+            </a:r>
+            <a:r>
+              <a:rPr lang="en-US" dirty="0"/>
+              <a:t>k</a:t>
+            </a:r>
+            <a:r>
+              <a:rPr lang="he-IL" dirty="0"/>
+              <a:t>- כמות מצולעים בסה"כ)</a:t>
+            </a:r>
+            <a:endParaRPr lang="en-US" dirty="0"/>
+          </a:p>
+          <a:p>
+            <a:r>
+              <a:rPr lang="he-IL" dirty="0"/>
+              <a:t>אם המצולעים "חופפים" מבחינת ה-"בפנים" שלהם, בצורה הבאה - </a:t>
+            </a:r>
+          </a:p>
+          <a:p>
+            <a:r>
+              <a:rPr lang="he-IL" dirty="0"/>
+              <a:t>שיטות ההוכחה שעובדות על החסם הקודם – לא עובדות יותר, ניתן להוכיח - </a:t>
+            </a:r>
+          </a:p>
+          <a:p>
+            <a:pPr marL="0" indent="0">
+              <a:buNone/>
+            </a:pPr>
+            <a:r>
+              <a:rPr lang="he-IL" dirty="0"/>
+              <a:t>חסם הדוק של </a:t>
+            </a:r>
+            <a:r>
+              <a:rPr lang="el-GR" dirty="0"/>
+              <a:t>Θ</a:t>
+            </a:r>
+            <a:r>
+              <a:rPr lang="en-US" dirty="0"/>
+              <a:t>(</a:t>
+            </a:r>
+            <a:r>
+              <a:rPr lang="en-US" dirty="0" err="1"/>
+              <a:t>nk</a:t>
+            </a:r>
+            <a:r>
+              <a:rPr lang="en-US" dirty="0"/>
+              <a:t>^{1/3}+n^{2/3}k^{2/3})</a:t>
+            </a:r>
+            <a:r>
+              <a:rPr lang="el-GR" dirty="0"/>
+              <a:t> </a:t>
+            </a:r>
+            <a:r>
+              <a:rPr lang="he-IL" dirty="0"/>
+              <a:t> בשימוש בטכניקת ההוכחה שהשתמשנו בה עבור ה</a:t>
+            </a:r>
+            <a:r>
+              <a:rPr lang="en-US" dirty="0"/>
+              <a:t>K-SETS</a:t>
+            </a:r>
+            <a:endParaRPr lang="he-IL" dirty="0"/>
+          </a:p>
+          <a:p>
+            <a:pPr marL="0" indent="0">
+              <a:buNone/>
+            </a:pPr>
+            <a:endParaRPr lang="he-IL" dirty="0"/>
+          </a:p>
+        </p:txBody>
+      </p:sp>
+      <p:pic>
+        <p:nvPicPr>
+          <p:cNvPr id="6" name="Picture 5">
+            <a:extLst>
+              <a:ext uri="{FF2B5EF4-FFF2-40B4-BE49-F238E27FC236}">
+                <a16:creationId xmlns:a16="http://schemas.microsoft.com/office/drawing/2014/main" id="{48DC7E04-CF02-4D19-8138-67667D0D0A5B}"/>
+              </a:ext>
+            </a:extLst>
+          </p:cNvPr>
+          <p:cNvPicPr>
+            <a:picLocks noChangeAspect="1"/>
+          </p:cNvPicPr>
+          <p:nvPr/>
+        </p:nvPicPr>
+        <p:blipFill>
+          <a:blip r:embed="rId2"/>
+          <a:stretch>
+            <a:fillRect/>
+          </a:stretch>
+        </p:blipFill>
         <p:spPr>
           <a:xfrm>
-            <a:off x="2231136" y="2319262"/>
-            <a:ext cx="7729728" cy="3930536"/>
+            <a:off x="183261" y="3305699"/>
+            <a:ext cx="2047875" cy="1504950"/>
           </a:xfrm>
+          <a:prstGeom prst="rect">
+            <a:avLst/>
+          </a:prstGeom>
         </p:spPr>
-        <p:txBody>
-          <a:bodyPr>
-            <a:normAutofit lnSpcReduction="10000"/>
-          </a:bodyPr>
-          <a:lstStyle/>
-          <a:p>
-            <a:r>
-              <a:rPr lang="he-IL" dirty="0"/>
-              <a:t>החסם הראשון שאי פעם הוצע לבעיה הוצע על ידי </a:t>
-            </a:r>
-            <a:r>
-              <a:rPr lang="en-US" dirty="0"/>
-              <a:t>László </a:t>
-            </a:r>
-            <a:r>
-              <a:rPr lang="en-US" dirty="0" err="1"/>
-              <a:t>Lovász</a:t>
-            </a:r>
-            <a:r>
-              <a:rPr lang="he-IL" dirty="0"/>
-              <a:t> (מתמטיקאי הונגרי זוכה פרס וולף) ב-1971, בפועל החסם נקבע עבור בעיה שהוכח בהמשך שכל חסם עליה שווה גם לחסם של </a:t>
-            </a:r>
-            <a:r>
-              <a:rPr lang="en-US" dirty="0"/>
-              <a:t>k-sets</a:t>
-            </a:r>
-            <a:r>
-              <a:rPr lang="he-IL" dirty="0"/>
-              <a:t> והיא </a:t>
-            </a:r>
-            <a:r>
-              <a:rPr lang="en-US" dirty="0"/>
-              <a:t>halving lines</a:t>
-            </a:r>
-            <a:r>
-              <a:rPr lang="he-IL" dirty="0"/>
-              <a:t> (עוד על בעיות קשורות בהמשך)</a:t>
-            </a:r>
-          </a:p>
-          <a:p>
-            <a:r>
-              <a:rPr lang="he-IL" dirty="0"/>
-              <a:t>הגדרה: עבור קבוצה </a:t>
-            </a:r>
-            <a:r>
-              <a:rPr lang="en-US" dirty="0"/>
-              <a:t>S</a:t>
-            </a:r>
-            <a:r>
-              <a:rPr lang="he-IL" dirty="0"/>
-              <a:t> בגודל </a:t>
-            </a:r>
-            <a:r>
-              <a:rPr lang="en-US" dirty="0"/>
-              <a:t>n</a:t>
-            </a:r>
-            <a:r>
-              <a:rPr lang="he-IL" dirty="0"/>
-              <a:t> של נקודות במישור </a:t>
-            </a:r>
-            <a:r>
-              <a:rPr lang="en-US" dirty="0"/>
-              <a:t>halving line</a:t>
-            </a:r>
-            <a:r>
-              <a:rPr lang="he-IL" dirty="0"/>
-              <a:t> הוא קטע שעובר בין שני נקודות של </a:t>
-            </a:r>
-            <a:r>
-              <a:rPr lang="en-US" dirty="0"/>
-              <a:t>S</a:t>
-            </a:r>
-            <a:r>
-              <a:rPr lang="he-IL" dirty="0"/>
-              <a:t> ומחלק את קבוצה </a:t>
-            </a:r>
-            <a:r>
-              <a:rPr lang="en-US" dirty="0"/>
-              <a:t>S</a:t>
-            </a:r>
-            <a:r>
-              <a:rPr lang="he-IL" dirty="0"/>
-              <a:t> לשני חלקים שווים.</a:t>
-            </a:r>
-          </a:p>
-          <a:p>
-            <a:r>
-              <a:rPr lang="he-IL" i="1" dirty="0"/>
-              <a:t>כמות </a:t>
-            </a:r>
-            <a:r>
-              <a:rPr lang="en-US" i="1" dirty="0"/>
-              <a:t>halving lines</a:t>
-            </a:r>
-            <a:r>
-              <a:rPr lang="he-IL" i="1" dirty="0"/>
-              <a:t> מקסימלית בקבוצה בגודל </a:t>
-            </a:r>
-            <a:r>
-              <a:rPr lang="en-US" i="1" dirty="0"/>
-              <a:t>n</a:t>
-            </a:r>
-            <a:r>
-              <a:rPr lang="he-IL" i="1" dirty="0"/>
-              <a:t>: </a:t>
-            </a:r>
-            <a:r>
-              <a:rPr lang="en-US" i="1" dirty="0"/>
-              <a:t>O(n</a:t>
-            </a:r>
-            <a:r>
-              <a:rPr lang="en-US" i="1" baseline="30000" dirty="0"/>
-              <a:t>3/2</a:t>
-            </a:r>
-            <a:r>
-              <a:rPr lang="en-US" i="1" dirty="0"/>
-              <a:t>)</a:t>
-            </a:r>
-          </a:p>
-          <a:p>
-            <a:r>
-              <a:rPr lang="he-IL" i="1" dirty="0"/>
-              <a:t>מאוחר יותר, ב1973 </a:t>
-            </a:r>
-            <a:r>
-              <a:rPr lang="en-US" dirty="0"/>
-              <a:t> </a:t>
-            </a:r>
-            <a:r>
-              <a:rPr lang="en-US" dirty="0" err="1"/>
-              <a:t>Erdõs</a:t>
-            </a:r>
-            <a:r>
-              <a:rPr lang="en-US" dirty="0"/>
-              <a:t>, </a:t>
-            </a:r>
-            <a:r>
-              <a:rPr lang="en-US" dirty="0" err="1"/>
-              <a:t>Lovász</a:t>
-            </a:r>
-            <a:r>
-              <a:rPr lang="en-US" dirty="0"/>
-              <a:t>, Simmons</a:t>
-            </a:r>
-            <a:r>
-              <a:rPr lang="he-IL" dirty="0"/>
-              <a:t> ו-</a:t>
-            </a:r>
-            <a:r>
-              <a:rPr lang="en-US" dirty="0"/>
-              <a:t> Strauss </a:t>
-            </a:r>
-            <a:r>
-              <a:rPr lang="he-IL" dirty="0"/>
-              <a:t> שיפרו את החסם עבור </a:t>
-            </a:r>
-            <a:r>
-              <a:rPr lang="en-US" dirty="0"/>
-              <a:t>k-sets</a:t>
-            </a:r>
-            <a:r>
-              <a:rPr lang="he-IL" dirty="0"/>
-              <a:t> לכל מספר </a:t>
-            </a:r>
-            <a:r>
-              <a:rPr lang="en-US" dirty="0"/>
-              <a:t>k</a:t>
-            </a:r>
-            <a:r>
-              <a:rPr lang="he-IL" dirty="0"/>
-              <a:t> ולכל </a:t>
-            </a:r>
-            <a:r>
-              <a:rPr lang="en-US" dirty="0"/>
-              <a:t>n</a:t>
-            </a:r>
-            <a:r>
-              <a:rPr lang="he-IL" dirty="0"/>
-              <a:t> להיות - </a:t>
-            </a:r>
-            <a:r>
-              <a:rPr lang="en-US" i="1" dirty="0"/>
-              <a:t>O(n k</a:t>
-            </a:r>
-            <a:r>
-              <a:rPr lang="en-US" i="1" baseline="30000" dirty="0"/>
-              <a:t>1/2</a:t>
-            </a:r>
-            <a:r>
-              <a:rPr lang="en-US" i="1" dirty="0"/>
-              <a:t>)</a:t>
-            </a:r>
-            <a:r>
-              <a:rPr lang="he-IL" i="1" dirty="0"/>
-              <a:t> – חסם הדוק יותר.</a:t>
-            </a:r>
-          </a:p>
-          <a:p>
-            <a:r>
-              <a:rPr lang="he-IL" i="1" dirty="0"/>
-              <a:t>החסם הנ"ל לא שופר עד 1989 – בה </a:t>
-            </a:r>
-            <a:r>
-              <a:rPr lang="en-US" dirty="0"/>
-              <a:t> </a:t>
-            </a:r>
-            <a:r>
-              <a:rPr lang="en-US" dirty="0" err="1"/>
-              <a:t>Pach</a:t>
-            </a:r>
-            <a:r>
-              <a:rPr lang="en-US" dirty="0"/>
-              <a:t>, </a:t>
-            </a:r>
-            <a:r>
-              <a:rPr lang="en-US" dirty="0" err="1"/>
-              <a:t>Steiger</a:t>
-            </a:r>
-            <a:r>
-              <a:rPr lang="he-IL" dirty="0"/>
-              <a:t> ו-</a:t>
-            </a:r>
-            <a:r>
-              <a:rPr lang="en-US" dirty="0"/>
-              <a:t> </a:t>
-            </a:r>
-            <a:r>
-              <a:rPr lang="en-US" dirty="0" err="1"/>
-              <a:t>Szemerédi</a:t>
-            </a:r>
-            <a:r>
-              <a:rPr lang="en-US" dirty="0"/>
-              <a:t> </a:t>
-            </a:r>
-            <a:r>
-              <a:rPr lang="he-IL" i="1" dirty="0"/>
-              <a:t> הצליחו להדק אותו ל-</a:t>
-            </a:r>
-            <a:r>
-              <a:rPr lang="pt-BR" i="1" dirty="0"/>
-              <a:t> O(n k</a:t>
-            </a:r>
-            <a:r>
-              <a:rPr lang="pt-BR" i="1" baseline="30000" dirty="0"/>
-              <a:t>1/2</a:t>
-            </a:r>
-            <a:r>
-              <a:rPr lang="pt-BR" i="1" dirty="0"/>
-              <a:t> / log</a:t>
-            </a:r>
-            <a:r>
-              <a:rPr lang="pt-BR" i="1" baseline="30000" dirty="0"/>
-              <a:t>*</a:t>
-            </a:r>
-            <a:r>
-              <a:rPr lang="pt-BR" i="1" dirty="0"/>
-              <a:t>n)</a:t>
-            </a:r>
-            <a:r>
-              <a:rPr lang="he-IL" i="1" dirty="0"/>
-              <a:t> – לא שיפור גדול כ"כ ביחס ל16 שנים</a:t>
-            </a:r>
-          </a:p>
-          <a:p>
-            <a:r>
-              <a:rPr lang="he-IL" i="1" dirty="0"/>
-              <a:t>המאמר שלנו מדבר על החסם הטוב ביותר שקיים עד היום </a:t>
-            </a:r>
-            <a:r>
-              <a:rPr lang="en-US" i="1" dirty="0"/>
-              <a:t>O</a:t>
-            </a:r>
-            <a:r>
-              <a:rPr lang="en-US" dirty="0"/>
-              <a:t>(</a:t>
-            </a:r>
-            <a:r>
-              <a:rPr lang="en-US" i="1" dirty="0"/>
-              <a:t>nk</a:t>
-            </a:r>
-            <a:r>
-              <a:rPr lang="en-US" baseline="30000" dirty="0"/>
-              <a:t>1/3</a:t>
-            </a:r>
-            <a:r>
-              <a:rPr lang="en-US" dirty="0"/>
-              <a:t>)</a:t>
-            </a:r>
-            <a:r>
-              <a:rPr lang="he-IL" dirty="0"/>
-              <a:t>- הוכח בשנת 1998 ע"י </a:t>
-            </a:r>
-            <a:r>
-              <a:rPr lang="en-US" b="1" dirty="0" err="1"/>
-              <a:t>Tamal</a:t>
-            </a:r>
-            <a:r>
-              <a:rPr lang="en-US" b="1" dirty="0"/>
-              <a:t> Krishna Dey</a:t>
-            </a:r>
-            <a:r>
-              <a:rPr lang="he-IL" b="1" dirty="0"/>
-              <a:t> פרופ' למדעי המחשב באונ' אוהיו.</a:t>
-            </a:r>
-            <a:endParaRPr lang="he-IL" dirty="0"/>
-          </a:p>
-        </p:txBody>
-      </p:sp>
+      </p:pic>
     </p:spTree>
     <p:extLst>
       <p:ext uri="{BB962C8B-B14F-4D97-AF65-F5344CB8AC3E}">
-        <p14:creationId xmlns:p14="http://schemas.microsoft.com/office/powerpoint/2010/main" val="1346651604"/>
+        <p14:creationId xmlns:p14="http://schemas.microsoft.com/office/powerpoint/2010/main" val="2067917691"/>
       </p:ext>
     </p:extLst>
   </p:cSld>
@@ -4882,6 +4743,929 @@
           <p:cNvPr id="2" name="Title 1">
             <a:extLst>
               <a:ext uri="{FF2B5EF4-FFF2-40B4-BE49-F238E27FC236}">
+                <a16:creationId xmlns:a16="http://schemas.microsoft.com/office/drawing/2014/main" id="{98A8A83B-59F6-4BA4-8738-F90085804EBE}"/>
+              </a:ext>
+            </a:extLst>
+          </p:cNvPr>
+          <p:cNvSpPr>
+            <a:spLocks noGrp="1"/>
+          </p:cNvSpPr>
+          <p:nvPr>
+            <p:ph type="title"/>
+          </p:nvPr>
+        </p:nvSpPr>
+        <p:spPr>
+          <a:xfrm>
+            <a:off x="2231136" y="360727"/>
+            <a:ext cx="7729728" cy="1792685"/>
+          </a:xfrm>
+        </p:spPr>
+        <p:txBody>
+          <a:bodyPr>
+            <a:normAutofit fontScale="90000"/>
+          </a:bodyPr>
+          <a:lstStyle/>
+          <a:p>
+            <a:r>
+              <a:rPr lang="he-IL" dirty="0"/>
+              <a:t>בעיות קשורות ואפליקציות של </a:t>
+            </a:r>
+            <a:r>
+              <a:rPr lang="en-US" dirty="0"/>
+              <a:t>  </a:t>
+            </a:r>
+            <a:br>
+              <a:rPr lang="en-US" dirty="0"/>
+            </a:br>
+            <a:r>
+              <a:rPr lang="en-US" dirty="0"/>
+              <a:t>:K-SETS</a:t>
+            </a:r>
+            <a:br>
+              <a:rPr lang="en-US" dirty="0"/>
+            </a:br>
+            <a:r>
+              <a:rPr lang="en-US" dirty="0"/>
+              <a:t>Convex Polygons and Matroid Optimization</a:t>
+            </a:r>
+            <a:endParaRPr lang="he-IL" dirty="0"/>
+          </a:p>
+        </p:txBody>
+      </p:sp>
+      <p:sp>
+        <p:nvSpPr>
+          <p:cNvPr id="3" name="Content Placeholder 2">
+            <a:extLst>
+              <a:ext uri="{FF2B5EF4-FFF2-40B4-BE49-F238E27FC236}">
+                <a16:creationId xmlns:a16="http://schemas.microsoft.com/office/drawing/2014/main" id="{9DE32AD8-F9A7-49DD-BC0A-C15120730AA2}"/>
+              </a:ext>
+            </a:extLst>
+          </p:cNvPr>
+          <p:cNvSpPr>
+            <a:spLocks noGrp="1"/>
+          </p:cNvSpPr>
+          <p:nvPr>
+            <p:ph idx="1"/>
+          </p:nvPr>
+        </p:nvSpPr>
+        <p:spPr/>
+        <p:txBody>
+          <a:bodyPr/>
+          <a:lstStyle/>
+          <a:p>
+            <a:r>
+              <a:rPr lang="he-IL" dirty="0"/>
+              <a:t>הוכחה על החסם הזה כוס עמ עמק </a:t>
+            </a:r>
+          </a:p>
+        </p:txBody>
+      </p:sp>
+    </p:spTree>
+    <p:extLst>
+      <p:ext uri="{BB962C8B-B14F-4D97-AF65-F5344CB8AC3E}">
+        <p14:creationId xmlns:p14="http://schemas.microsoft.com/office/powerpoint/2010/main" val="2515538919"/>
+      </p:ext>
+    </p:extLst>
+  </p:cSld>
+  <p:clrMapOvr>
+    <a:masterClrMapping/>
+  </p:clrMapOvr>
+</p:sld>
+</file>
+
+<file path=ppt/slides/slide17.xml><?xml version="1.0" encoding="utf-8"?>
+<p:sld xmlns:a="http://schemas.openxmlformats.org/drawingml/2006/main" xmlns:r="http://schemas.openxmlformats.org/officeDocument/2006/relationships" xmlns:p="http://schemas.openxmlformats.org/presentationml/2006/main">
+  <p:cSld>
+    <p:spTree>
+      <p:nvGrpSpPr>
+        <p:cNvPr id="1" name=""/>
+        <p:cNvGrpSpPr/>
+        <p:nvPr/>
+      </p:nvGrpSpPr>
+      <p:grpSpPr>
+        <a:xfrm>
+          <a:off x="0" y="0"/>
+          <a:ext cx="0" cy="0"/>
+          <a:chOff x="0" y="0"/>
+          <a:chExt cx="0" cy="0"/>
+        </a:xfrm>
+      </p:grpSpPr>
+      <p:sp>
+        <p:nvSpPr>
+          <p:cNvPr id="2" name="Title 1">
+            <a:extLst>
+              <a:ext uri="{FF2B5EF4-FFF2-40B4-BE49-F238E27FC236}">
+                <a16:creationId xmlns:a16="http://schemas.microsoft.com/office/drawing/2014/main" id="{0E841BA4-42C2-4A5D-8382-9D1CD36C96AF}"/>
+              </a:ext>
+            </a:extLst>
+          </p:cNvPr>
+          <p:cNvSpPr>
+            <a:spLocks noGrp="1"/>
+          </p:cNvSpPr>
+          <p:nvPr>
+            <p:ph type="title"/>
+          </p:nvPr>
+        </p:nvSpPr>
+        <p:spPr>
+          <a:xfrm>
+            <a:off x="2231136" y="394283"/>
+            <a:ext cx="7729728" cy="1759129"/>
+          </a:xfrm>
+        </p:spPr>
+        <p:txBody>
+          <a:bodyPr>
+            <a:normAutofit fontScale="90000"/>
+          </a:bodyPr>
+          <a:lstStyle/>
+          <a:p>
+            <a:r>
+              <a:rPr lang="he-IL" dirty="0"/>
+              <a:t>בעיות קשורות ואפליקציות של </a:t>
+            </a:r>
+            <a:r>
+              <a:rPr lang="en-US" dirty="0"/>
+              <a:t>  </a:t>
+            </a:r>
+            <a:br>
+              <a:rPr lang="en-US" dirty="0"/>
+            </a:br>
+            <a:r>
+              <a:rPr lang="en-US" dirty="0"/>
+              <a:t>:K-SETS</a:t>
+            </a:r>
+            <a:br>
+              <a:rPr lang="en-US" dirty="0"/>
+            </a:br>
+            <a:r>
+              <a:rPr lang="en-US" dirty="0"/>
+              <a:t>Complexity of j Consecutive Levels</a:t>
+            </a:r>
+            <a:endParaRPr lang="he-IL" dirty="0"/>
+          </a:p>
+        </p:txBody>
+      </p:sp>
+      <p:sp>
+        <p:nvSpPr>
+          <p:cNvPr id="3" name="Content Placeholder 2">
+            <a:extLst>
+              <a:ext uri="{FF2B5EF4-FFF2-40B4-BE49-F238E27FC236}">
+                <a16:creationId xmlns:a16="http://schemas.microsoft.com/office/drawing/2014/main" id="{037438B0-578E-4B51-BAC0-B8463FB17914}"/>
+              </a:ext>
+            </a:extLst>
+          </p:cNvPr>
+          <p:cNvSpPr>
+            <a:spLocks noGrp="1"/>
+          </p:cNvSpPr>
+          <p:nvPr>
+            <p:ph idx="1"/>
+          </p:nvPr>
+        </p:nvSpPr>
+        <p:spPr>
+          <a:xfrm>
+            <a:off x="2231136" y="2638044"/>
+            <a:ext cx="7729728" cy="3938925"/>
+          </a:xfrm>
+        </p:spPr>
+        <p:txBody>
+          <a:bodyPr>
+            <a:normAutofit fontScale="62500" lnSpcReduction="20000"/>
+          </a:bodyPr>
+          <a:lstStyle/>
+          <a:p>
+            <a:r>
+              <a:rPr lang="he-IL" dirty="0"/>
+              <a:t>יהיו </a:t>
+            </a:r>
+            <a:r>
+              <a:rPr lang="en-US" dirty="0"/>
+              <a:t>Lk,Lk-1,Lk-2,…,Lk-j+1</a:t>
+            </a:r>
+            <a:r>
+              <a:rPr lang="he-IL" dirty="0"/>
+              <a:t> עבור </a:t>
+            </a:r>
+            <a:r>
+              <a:rPr lang="en-US" dirty="0"/>
+              <a:t>j&gt;0</a:t>
+            </a:r>
+            <a:r>
+              <a:rPr lang="he-IL" dirty="0"/>
+              <a:t> "רמות" רציפות מסודרות ב</a:t>
+            </a:r>
+            <a:r>
+              <a:rPr lang="en-US" dirty="0"/>
+              <a:t>n</a:t>
+            </a:r>
+            <a:r>
+              <a:rPr lang="he-IL" dirty="0"/>
+              <a:t> ישרים</a:t>
+            </a:r>
+          </a:p>
+          <a:p>
+            <a:r>
+              <a:rPr lang="he-IL" dirty="0"/>
+              <a:t>אנחנו מעוניינים להכריע מה הסיבוכיות של </a:t>
+            </a:r>
+            <a:r>
+              <a:rPr lang="en-US" dirty="0"/>
+              <a:t>j</a:t>
+            </a:r>
+            <a:r>
+              <a:rPr lang="he-IL" dirty="0"/>
+              <a:t> הרמות בסה"כ</a:t>
+            </a:r>
+          </a:p>
+          <a:p>
+            <a:r>
+              <a:rPr lang="he-IL" dirty="0"/>
+              <a:t>לפי דואליות, הסיבוכיות הזו רחוקה לכל היותר בקבוע מכמות ה</a:t>
+            </a:r>
+            <a:r>
+              <a:rPr lang="en-US" dirty="0"/>
+              <a:t>l-sets</a:t>
+            </a:r>
+            <a:r>
+              <a:rPr lang="he-IL" dirty="0"/>
+              <a:t> המתקבלת מהפעלת הפונ הדואלית, כאשר –</a:t>
+            </a:r>
+            <a:r>
+              <a:rPr lang="en-US" dirty="0"/>
+              <a:t>k-j+1 ≥l ≥k </a:t>
+            </a:r>
+            <a:endParaRPr lang="he-IL" dirty="0"/>
+          </a:p>
+          <a:p>
+            <a:r>
+              <a:rPr lang="he-IL" dirty="0"/>
+              <a:t>נשקול את החלוקה</a:t>
+            </a:r>
+            <a:r>
+              <a:rPr lang="en-US" dirty="0"/>
+              <a:t>El </a:t>
+            </a:r>
+            <a:r>
+              <a:rPr lang="he-IL" dirty="0"/>
+              <a:t> ל-</a:t>
+            </a:r>
+            <a:r>
+              <a:rPr lang="en-US" dirty="0"/>
+              <a:t>convex chains</a:t>
+            </a:r>
+            <a:endParaRPr lang="he-IL" dirty="0"/>
+          </a:p>
+          <a:p>
+            <a:r>
+              <a:rPr lang="he-IL" dirty="0"/>
+              <a:t>עבור כל </a:t>
+            </a:r>
+            <a:r>
+              <a:rPr lang="en-US" dirty="0"/>
+              <a:t>l</a:t>
+            </a:r>
+            <a:r>
+              <a:rPr lang="he-IL" dirty="0"/>
+              <a:t> שמקיים </a:t>
+            </a:r>
+            <a:r>
+              <a:rPr lang="en-US" dirty="0"/>
+              <a:t>k-j+1 ≥l ≥k </a:t>
+            </a:r>
+            <a:endParaRPr lang="he-IL" dirty="0"/>
+          </a:p>
+          <a:p>
+            <a:r>
+              <a:rPr lang="he-IL" dirty="0"/>
+              <a:t>נשתמש בחלקים 2  ו-3 של ההוכחה הקודמת על </a:t>
+            </a:r>
+            <a:r>
+              <a:rPr lang="en-US" dirty="0"/>
+              <a:t>O(</a:t>
+            </a:r>
+            <a:r>
+              <a:rPr lang="en-US" dirty="0" err="1"/>
+              <a:t>jk</a:t>
+            </a:r>
+            <a:r>
+              <a:rPr lang="en-US" dirty="0"/>
+              <a:t>)</a:t>
+            </a:r>
+            <a:r>
+              <a:rPr lang="he-IL" dirty="0"/>
+              <a:t> ה-</a:t>
+            </a:r>
+            <a:r>
+              <a:rPr lang="en-US" dirty="0"/>
+              <a:t>convex chains</a:t>
+            </a:r>
+            <a:endParaRPr lang="he-IL" dirty="0"/>
+          </a:p>
+          <a:p>
+            <a:r>
+              <a:rPr lang="he-IL" dirty="0"/>
+              <a:t>כיוון שכל משיק משותף שניצור הוא </a:t>
+            </a:r>
+            <a:r>
+              <a:rPr lang="en-US" dirty="0"/>
+              <a:t>m-set-edge</a:t>
+            </a:r>
+            <a:r>
+              <a:rPr lang="he-IL" dirty="0"/>
+              <a:t> עבור </a:t>
+            </a:r>
+            <a:r>
+              <a:rPr lang="en-US" dirty="0"/>
+              <a:t>m&gt;k</a:t>
+            </a:r>
+            <a:r>
+              <a:rPr lang="he-IL" dirty="0"/>
+              <a:t> נקבל </a:t>
+            </a:r>
+            <a:r>
+              <a:rPr lang="en-US" dirty="0"/>
+              <a:t>O(</a:t>
+            </a:r>
+            <a:r>
+              <a:rPr lang="en-US" dirty="0" err="1"/>
+              <a:t>nk</a:t>
+            </a:r>
+            <a:r>
+              <a:rPr lang="en-US" dirty="0"/>
+              <a:t>)</a:t>
+            </a:r>
+            <a:r>
+              <a:rPr lang="he-IL" dirty="0"/>
+              <a:t> משיקים שנוצרו</a:t>
+            </a:r>
+          </a:p>
+          <a:p>
+            <a:r>
+              <a:rPr lang="he-IL" dirty="0"/>
+              <a:t>כעת, אנחנו טוענים שכל משיק מתאים לכל היותר </a:t>
+            </a:r>
+            <a:r>
+              <a:rPr lang="en-US" dirty="0"/>
+              <a:t>O(j^2)</a:t>
+            </a:r>
+            <a:r>
+              <a:rPr lang="he-IL" dirty="0"/>
+              <a:t> פעמים</a:t>
+            </a:r>
+          </a:p>
+          <a:p>
+            <a:r>
+              <a:rPr lang="he-IL" dirty="0"/>
+              <a:t>משיק </a:t>
+            </a:r>
+            <a:r>
+              <a:rPr lang="en-US" dirty="0"/>
+              <a:t>T</a:t>
+            </a:r>
+            <a:r>
+              <a:rPr lang="he-IL" dirty="0"/>
+              <a:t> לא יכול להיווצר עבור שני זוגות - </a:t>
+            </a:r>
+            <a:r>
+              <a:rPr lang="en-US" dirty="0"/>
+              <a:t>C1 C2</a:t>
+            </a:r>
+            <a:r>
+              <a:rPr lang="he-IL" dirty="0"/>
+              <a:t> ו-</a:t>
+            </a:r>
+            <a:r>
+              <a:rPr lang="en-US" dirty="0"/>
+              <a:t>C3 C4</a:t>
+            </a:r>
+            <a:r>
+              <a:rPr lang="he-IL" dirty="0"/>
+              <a:t> כאשר </a:t>
+            </a:r>
+            <a:r>
+              <a:rPr lang="en-US" dirty="0"/>
+              <a:t>C1 C3</a:t>
+            </a:r>
+            <a:r>
+              <a:rPr lang="he-IL" dirty="0"/>
+              <a:t> עוברים דרך נק הקצה השמאלית של </a:t>
+            </a:r>
+            <a:r>
+              <a:rPr lang="en-US" dirty="0"/>
+              <a:t>T</a:t>
+            </a:r>
+            <a:r>
+              <a:rPr lang="he-IL" dirty="0"/>
+              <a:t> או </a:t>
+            </a:r>
+            <a:r>
+              <a:rPr lang="en-US" dirty="0"/>
+              <a:t>C2 C4</a:t>
+            </a:r>
+            <a:r>
+              <a:rPr lang="he-IL" dirty="0"/>
+              <a:t> עוברים דרך נקודת הקצה הימנית, זה קורה לפי -</a:t>
+            </a:r>
+          </a:p>
+          <a:p>
+            <a:r>
+              <a:rPr lang="en-US" dirty="0"/>
+              <a:t>lemma 3.1</a:t>
+            </a:r>
+            <a:r>
+              <a:rPr lang="he-IL" dirty="0"/>
+              <a:t> כלומר, יש לכל היותר </a:t>
+            </a:r>
+            <a:r>
+              <a:rPr lang="en-US" dirty="0"/>
+              <a:t>j choose 2</a:t>
+            </a:r>
+            <a:r>
+              <a:rPr lang="he-IL" dirty="0"/>
+              <a:t> זוגות שונים שיכולים ליצור את</a:t>
+            </a:r>
+            <a:r>
+              <a:rPr lang="en-US" dirty="0"/>
+              <a:t> </a:t>
+            </a:r>
+            <a:r>
+              <a:rPr lang="he-IL" dirty="0"/>
+              <a:t> </a:t>
+            </a:r>
+            <a:r>
+              <a:rPr lang="en-US" dirty="0"/>
+              <a:t>T</a:t>
+            </a:r>
+            <a:r>
+              <a:rPr lang="he-IL" dirty="0"/>
+              <a:t> </a:t>
+            </a:r>
+          </a:p>
+          <a:p>
+            <a:r>
+              <a:rPr lang="he-IL" dirty="0"/>
+              <a:t>כעת נותר רק להציב באי שיוויון – </a:t>
+            </a:r>
+          </a:p>
+          <a:p>
+            <a:pPr marL="0" indent="0">
+              <a:buNone/>
+            </a:pPr>
+            <a:r>
+              <a:rPr lang="en-US" dirty="0"/>
+              <a:t>T^{3}/n^{2}&lt;</a:t>
+            </a:r>
+            <a:r>
+              <a:rPr lang="en-US" dirty="0" err="1"/>
+              <a:t>cnj</a:t>
+            </a:r>
+            <a:r>
+              <a:rPr lang="en-US" dirty="0"/>
+              <a:t>^{2}(k+1)                                                         </a:t>
+            </a:r>
+          </a:p>
+          <a:p>
+            <a:r>
+              <a:rPr lang="he-IL" dirty="0"/>
+              <a:t>עבור </a:t>
+            </a:r>
+            <a:r>
+              <a:rPr lang="en-US" dirty="0"/>
+              <a:t>c&gt;0</a:t>
+            </a:r>
+            <a:r>
+              <a:rPr lang="he-IL" dirty="0"/>
+              <a:t> מתאים נקבל – </a:t>
+            </a:r>
+            <a:r>
+              <a:rPr lang="en-US"/>
+              <a:t>t=O(n(k+1)^{1/3}j^{2/3})</a:t>
+            </a:r>
+            <a:endParaRPr lang="he-IL" dirty="0"/>
+          </a:p>
+        </p:txBody>
+      </p:sp>
+    </p:spTree>
+    <p:extLst>
+      <p:ext uri="{BB962C8B-B14F-4D97-AF65-F5344CB8AC3E}">
+        <p14:creationId xmlns:p14="http://schemas.microsoft.com/office/powerpoint/2010/main" val="1820227415"/>
+      </p:ext>
+    </p:extLst>
+  </p:cSld>
+  <p:clrMapOvr>
+    <a:masterClrMapping/>
+  </p:clrMapOvr>
+</p:sld>
+</file>
+
+<file path=ppt/slides/slide18.xml><?xml version="1.0" encoding="utf-8"?>
+<p:sld xmlns:a="http://schemas.openxmlformats.org/drawingml/2006/main" xmlns:r="http://schemas.openxmlformats.org/officeDocument/2006/relationships" xmlns:p="http://schemas.openxmlformats.org/presentationml/2006/main">
+  <p:cSld>
+    <p:spTree>
+      <p:nvGrpSpPr>
+        <p:cNvPr id="1" name=""/>
+        <p:cNvGrpSpPr/>
+        <p:nvPr/>
+      </p:nvGrpSpPr>
+      <p:grpSpPr>
+        <a:xfrm>
+          <a:off x="0" y="0"/>
+          <a:ext cx="0" cy="0"/>
+          <a:chOff x="0" y="0"/>
+          <a:chExt cx="0" cy="0"/>
+        </a:xfrm>
+      </p:grpSpPr>
+      <p:sp>
+        <p:nvSpPr>
+          <p:cNvPr id="2" name="Title 1">
+            <a:extLst>
+              <a:ext uri="{FF2B5EF4-FFF2-40B4-BE49-F238E27FC236}">
+                <a16:creationId xmlns:a16="http://schemas.microsoft.com/office/drawing/2014/main" id="{0ED3C801-6C96-4123-BDB9-1AD8CF3EC460}"/>
+              </a:ext>
+            </a:extLst>
+          </p:cNvPr>
+          <p:cNvSpPr>
+            <a:spLocks noGrp="1"/>
+          </p:cNvSpPr>
+          <p:nvPr>
+            <p:ph type="title"/>
+          </p:nvPr>
+        </p:nvSpPr>
+        <p:spPr/>
+        <p:txBody>
+          <a:bodyPr/>
+          <a:lstStyle/>
+          <a:p>
+            <a:r>
+              <a:rPr lang="he-IL" dirty="0"/>
+              <a:t>היסטוריה</a:t>
+            </a:r>
+          </a:p>
+        </p:txBody>
+      </p:sp>
+      <p:sp>
+        <p:nvSpPr>
+          <p:cNvPr id="3" name="Content Placeholder 2">
+            <a:extLst>
+              <a:ext uri="{FF2B5EF4-FFF2-40B4-BE49-F238E27FC236}">
+                <a16:creationId xmlns:a16="http://schemas.microsoft.com/office/drawing/2014/main" id="{8DE18717-999B-498B-B6D5-5F0AC39DFDD1}"/>
+              </a:ext>
+            </a:extLst>
+          </p:cNvPr>
+          <p:cNvSpPr>
+            <a:spLocks noGrp="1"/>
+          </p:cNvSpPr>
+          <p:nvPr>
+            <p:ph idx="1"/>
+          </p:nvPr>
+        </p:nvSpPr>
+        <p:spPr>
+          <a:xfrm>
+            <a:off x="2231136" y="2319262"/>
+            <a:ext cx="7729728" cy="3930536"/>
+          </a:xfrm>
+        </p:spPr>
+        <p:txBody>
+          <a:bodyPr>
+            <a:normAutofit lnSpcReduction="10000"/>
+          </a:bodyPr>
+          <a:lstStyle/>
+          <a:p>
+            <a:r>
+              <a:rPr lang="he-IL" dirty="0"/>
+              <a:t>החסם הראשון שאי פעם הוצע לבעיה הוצע על ידי </a:t>
+            </a:r>
+            <a:r>
+              <a:rPr lang="en-US" dirty="0"/>
+              <a:t>László </a:t>
+            </a:r>
+            <a:r>
+              <a:rPr lang="en-US" dirty="0" err="1"/>
+              <a:t>Lovász</a:t>
+            </a:r>
+            <a:r>
+              <a:rPr lang="he-IL" dirty="0"/>
+              <a:t> (מתמטיקאי הונגרי זוכה פרס וולף) ב-1971, בפועל החסם נקבע עבור בעיה שהוכח בהמשך שכל חסם עליה שווה גם לחסם של </a:t>
+            </a:r>
+            <a:r>
+              <a:rPr lang="en-US" dirty="0"/>
+              <a:t>k-sets</a:t>
+            </a:r>
+            <a:r>
+              <a:rPr lang="he-IL" dirty="0"/>
+              <a:t> והיא </a:t>
+            </a:r>
+            <a:r>
+              <a:rPr lang="en-US" dirty="0"/>
+              <a:t>halving lines</a:t>
+            </a:r>
+            <a:r>
+              <a:rPr lang="he-IL" dirty="0"/>
+              <a:t> (עוד על בעיות קשורות בהמשך)</a:t>
+            </a:r>
+          </a:p>
+          <a:p>
+            <a:r>
+              <a:rPr lang="he-IL" dirty="0"/>
+              <a:t>הגדרה: עבור קבוצה </a:t>
+            </a:r>
+            <a:r>
+              <a:rPr lang="en-US" dirty="0"/>
+              <a:t>S</a:t>
+            </a:r>
+            <a:r>
+              <a:rPr lang="he-IL" dirty="0"/>
+              <a:t> בגודל </a:t>
+            </a:r>
+            <a:r>
+              <a:rPr lang="en-US" dirty="0"/>
+              <a:t>n</a:t>
+            </a:r>
+            <a:r>
+              <a:rPr lang="he-IL" dirty="0"/>
+              <a:t> של נקודות במישור </a:t>
+            </a:r>
+            <a:r>
+              <a:rPr lang="en-US" dirty="0"/>
+              <a:t>halving line</a:t>
+            </a:r>
+            <a:r>
+              <a:rPr lang="he-IL" dirty="0"/>
+              <a:t> הוא קטע שעובר בין שני נקודות של </a:t>
+            </a:r>
+            <a:r>
+              <a:rPr lang="en-US" dirty="0"/>
+              <a:t>S</a:t>
+            </a:r>
+            <a:r>
+              <a:rPr lang="he-IL" dirty="0"/>
+              <a:t> ומחלק את קבוצה </a:t>
+            </a:r>
+            <a:r>
+              <a:rPr lang="en-US" dirty="0"/>
+              <a:t>S</a:t>
+            </a:r>
+            <a:r>
+              <a:rPr lang="he-IL" dirty="0"/>
+              <a:t> לשני חלקים שווים.</a:t>
+            </a:r>
+          </a:p>
+          <a:p>
+            <a:r>
+              <a:rPr lang="he-IL" i="1" dirty="0"/>
+              <a:t>כמות </a:t>
+            </a:r>
+            <a:r>
+              <a:rPr lang="en-US" i="1" dirty="0"/>
+              <a:t>halving lines</a:t>
+            </a:r>
+            <a:r>
+              <a:rPr lang="he-IL" i="1" dirty="0"/>
+              <a:t> מקסימלית בקבוצה בגודל </a:t>
+            </a:r>
+            <a:r>
+              <a:rPr lang="en-US" i="1" dirty="0"/>
+              <a:t>n</a:t>
+            </a:r>
+            <a:r>
+              <a:rPr lang="he-IL" i="1" dirty="0"/>
+              <a:t>: </a:t>
+            </a:r>
+            <a:r>
+              <a:rPr lang="en-US" i="1" dirty="0"/>
+              <a:t>O(n</a:t>
+            </a:r>
+            <a:r>
+              <a:rPr lang="en-US" i="1" baseline="30000" dirty="0"/>
+              <a:t>3/2</a:t>
+            </a:r>
+            <a:r>
+              <a:rPr lang="en-US" i="1" dirty="0"/>
+              <a:t>)</a:t>
+            </a:r>
+          </a:p>
+          <a:p>
+            <a:r>
+              <a:rPr lang="he-IL" i="1" dirty="0"/>
+              <a:t>מאוחר יותר, ב1973 </a:t>
+            </a:r>
+            <a:r>
+              <a:rPr lang="en-US" dirty="0"/>
+              <a:t> </a:t>
+            </a:r>
+            <a:r>
+              <a:rPr lang="en-US" dirty="0" err="1"/>
+              <a:t>Erdõs</a:t>
+            </a:r>
+            <a:r>
+              <a:rPr lang="en-US" dirty="0"/>
+              <a:t>, </a:t>
+            </a:r>
+            <a:r>
+              <a:rPr lang="en-US" dirty="0" err="1"/>
+              <a:t>Lovász</a:t>
+            </a:r>
+            <a:r>
+              <a:rPr lang="en-US" dirty="0"/>
+              <a:t>, Simmons</a:t>
+            </a:r>
+            <a:r>
+              <a:rPr lang="he-IL" dirty="0"/>
+              <a:t> ו-</a:t>
+            </a:r>
+            <a:r>
+              <a:rPr lang="en-US" dirty="0"/>
+              <a:t> Strauss </a:t>
+            </a:r>
+            <a:r>
+              <a:rPr lang="he-IL" dirty="0"/>
+              <a:t> שיפרו את החסם עבור </a:t>
+            </a:r>
+            <a:r>
+              <a:rPr lang="en-US" dirty="0"/>
+              <a:t>k-sets</a:t>
+            </a:r>
+            <a:r>
+              <a:rPr lang="he-IL" dirty="0"/>
+              <a:t> לכל מספר </a:t>
+            </a:r>
+            <a:r>
+              <a:rPr lang="en-US" dirty="0"/>
+              <a:t>k</a:t>
+            </a:r>
+            <a:r>
+              <a:rPr lang="he-IL" dirty="0"/>
+              <a:t> ולכל </a:t>
+            </a:r>
+            <a:r>
+              <a:rPr lang="en-US" dirty="0"/>
+              <a:t>n</a:t>
+            </a:r>
+            <a:r>
+              <a:rPr lang="he-IL" dirty="0"/>
+              <a:t> להיות - </a:t>
+            </a:r>
+            <a:r>
+              <a:rPr lang="en-US" i="1" dirty="0"/>
+              <a:t>O(n k</a:t>
+            </a:r>
+            <a:r>
+              <a:rPr lang="en-US" i="1" baseline="30000" dirty="0"/>
+              <a:t>1/2</a:t>
+            </a:r>
+            <a:r>
+              <a:rPr lang="en-US" i="1" dirty="0"/>
+              <a:t>)</a:t>
+            </a:r>
+            <a:r>
+              <a:rPr lang="he-IL" i="1" dirty="0"/>
+              <a:t> – חסם הדוק יותר.</a:t>
+            </a:r>
+          </a:p>
+          <a:p>
+            <a:r>
+              <a:rPr lang="he-IL" i="1" dirty="0"/>
+              <a:t>החסם הנ"ל לא שופר עד 1989 – בה </a:t>
+            </a:r>
+            <a:r>
+              <a:rPr lang="en-US" dirty="0"/>
+              <a:t> </a:t>
+            </a:r>
+            <a:r>
+              <a:rPr lang="en-US" dirty="0" err="1"/>
+              <a:t>Pach</a:t>
+            </a:r>
+            <a:r>
+              <a:rPr lang="en-US" dirty="0"/>
+              <a:t>, </a:t>
+            </a:r>
+            <a:r>
+              <a:rPr lang="en-US" dirty="0" err="1"/>
+              <a:t>Steiger</a:t>
+            </a:r>
+            <a:r>
+              <a:rPr lang="he-IL" dirty="0"/>
+              <a:t> ו-</a:t>
+            </a:r>
+            <a:r>
+              <a:rPr lang="en-US" dirty="0"/>
+              <a:t> </a:t>
+            </a:r>
+            <a:r>
+              <a:rPr lang="en-US" dirty="0" err="1"/>
+              <a:t>Szemerédi</a:t>
+            </a:r>
+            <a:r>
+              <a:rPr lang="en-US" dirty="0"/>
+              <a:t> </a:t>
+            </a:r>
+            <a:r>
+              <a:rPr lang="he-IL" i="1" dirty="0"/>
+              <a:t> הצליחו להדק אותו ל-</a:t>
+            </a:r>
+            <a:r>
+              <a:rPr lang="pt-BR" i="1" dirty="0"/>
+              <a:t> O(n k</a:t>
+            </a:r>
+            <a:r>
+              <a:rPr lang="pt-BR" i="1" baseline="30000" dirty="0"/>
+              <a:t>1/2</a:t>
+            </a:r>
+            <a:r>
+              <a:rPr lang="pt-BR" i="1" dirty="0"/>
+              <a:t> / log</a:t>
+            </a:r>
+            <a:r>
+              <a:rPr lang="pt-BR" i="1" baseline="30000" dirty="0"/>
+              <a:t>*</a:t>
+            </a:r>
+            <a:r>
+              <a:rPr lang="pt-BR" i="1" dirty="0"/>
+              <a:t>n)</a:t>
+            </a:r>
+            <a:r>
+              <a:rPr lang="he-IL" i="1" dirty="0"/>
+              <a:t> – לא שיפור גדול כ"כ ביחס ל16 שנים</a:t>
+            </a:r>
+          </a:p>
+          <a:p>
+            <a:r>
+              <a:rPr lang="he-IL" i="1" dirty="0"/>
+              <a:t>המאמר שלנו מדבר על החסם הטוב ביותר שקיים עד היום </a:t>
+            </a:r>
+            <a:r>
+              <a:rPr lang="en-US" i="1" dirty="0"/>
+              <a:t>O</a:t>
+            </a:r>
+            <a:r>
+              <a:rPr lang="en-US" dirty="0"/>
+              <a:t>(</a:t>
+            </a:r>
+            <a:r>
+              <a:rPr lang="en-US" i="1" dirty="0"/>
+              <a:t>nk</a:t>
+            </a:r>
+            <a:r>
+              <a:rPr lang="en-US" baseline="30000" dirty="0"/>
+              <a:t>1/3</a:t>
+            </a:r>
+            <a:r>
+              <a:rPr lang="en-US" dirty="0"/>
+              <a:t>)</a:t>
+            </a:r>
+            <a:r>
+              <a:rPr lang="he-IL" dirty="0"/>
+              <a:t>- הוכח בשנת 1998 ע"י </a:t>
+            </a:r>
+            <a:r>
+              <a:rPr lang="en-US" b="1" dirty="0" err="1"/>
+              <a:t>Tamal</a:t>
+            </a:r>
+            <a:r>
+              <a:rPr lang="en-US" b="1" dirty="0"/>
+              <a:t> Krishna Dey</a:t>
+            </a:r>
+            <a:r>
+              <a:rPr lang="he-IL" b="1" dirty="0"/>
+              <a:t> פרופ' למדעי המחשב באונ' אוהיו.</a:t>
+            </a:r>
+            <a:endParaRPr lang="he-IL" dirty="0"/>
+          </a:p>
+        </p:txBody>
+      </p:sp>
+    </p:spTree>
+    <p:extLst>
+      <p:ext uri="{BB962C8B-B14F-4D97-AF65-F5344CB8AC3E}">
+        <p14:creationId xmlns:p14="http://schemas.microsoft.com/office/powerpoint/2010/main" val="1346651604"/>
+      </p:ext>
+    </p:extLst>
+  </p:cSld>
+  <p:clrMapOvr>
+    <a:masterClrMapping/>
+  </p:clrMapOvr>
+</p:sld>
+</file>
+
+<file path=ppt/slides/slide19.xml><?xml version="1.0" encoding="utf-8"?>
+<p:sld xmlns:a="http://schemas.openxmlformats.org/drawingml/2006/main" xmlns:r="http://schemas.openxmlformats.org/officeDocument/2006/relationships" xmlns:p="http://schemas.openxmlformats.org/presentationml/2006/main">
+  <p:cSld>
+    <p:spTree>
+      <p:nvGrpSpPr>
+        <p:cNvPr id="1" name=""/>
+        <p:cNvGrpSpPr/>
+        <p:nvPr/>
+      </p:nvGrpSpPr>
+      <p:grpSpPr>
+        <a:xfrm>
+          <a:off x="0" y="0"/>
+          <a:ext cx="0" cy="0"/>
+          <a:chOff x="0" y="0"/>
+          <a:chExt cx="0" cy="0"/>
+        </a:xfrm>
+      </p:grpSpPr>
+      <p:sp>
+        <p:nvSpPr>
+          <p:cNvPr id="2" name="Title 1">
+            <a:extLst>
+              <a:ext uri="{FF2B5EF4-FFF2-40B4-BE49-F238E27FC236}">
                 <a16:creationId xmlns:a16="http://schemas.microsoft.com/office/drawing/2014/main" id="{CEB86A80-141A-4ABC-A8F0-B9062A0C2B85}"/>
               </a:ext>
             </a:extLst>
@@ -4989,7 +5773,243 @@
 </p:sld>
 </file>
 
-<file path=ppt/slides/slide17.xml><?xml version="1.0" encoding="utf-8"?>
+<file path=ppt/slides/slide2.xml><?xml version="1.0" encoding="utf-8"?>
+<p:sld xmlns:a="http://schemas.openxmlformats.org/drawingml/2006/main" xmlns:r="http://schemas.openxmlformats.org/officeDocument/2006/relationships" xmlns:p="http://schemas.openxmlformats.org/presentationml/2006/main">
+  <p:cSld>
+    <p:spTree>
+      <p:nvGrpSpPr>
+        <p:cNvPr id="1" name=""/>
+        <p:cNvGrpSpPr/>
+        <p:nvPr/>
+      </p:nvGrpSpPr>
+      <p:grpSpPr>
+        <a:xfrm>
+          <a:off x="0" y="0"/>
+          <a:ext cx="0" cy="0"/>
+          <a:chOff x="0" y="0"/>
+          <a:chExt cx="0" cy="0"/>
+        </a:xfrm>
+      </p:grpSpPr>
+      <p:sp>
+        <p:nvSpPr>
+          <p:cNvPr id="2" name="Title 1">
+            <a:extLst>
+              <a:ext uri="{FF2B5EF4-FFF2-40B4-BE49-F238E27FC236}">
+                <a16:creationId xmlns:a16="http://schemas.microsoft.com/office/drawing/2014/main" id="{05AE25FC-4EFC-4295-9A3C-6DCB52DDB3A8}"/>
+              </a:ext>
+            </a:extLst>
+          </p:cNvPr>
+          <p:cNvSpPr>
+            <a:spLocks noGrp="1"/>
+          </p:cNvSpPr>
+          <p:nvPr>
+            <p:ph type="title"/>
+          </p:nvPr>
+        </p:nvSpPr>
+        <p:spPr/>
+        <p:txBody>
+          <a:bodyPr/>
+          <a:lstStyle/>
+          <a:p>
+            <a:r>
+              <a:rPr lang="en-US" dirty="0"/>
+              <a:t>k-set</a:t>
+            </a:r>
+            <a:endParaRPr lang="he-IL" dirty="0"/>
+          </a:p>
+        </p:txBody>
+      </p:sp>
+      <p:sp>
+        <p:nvSpPr>
+          <p:cNvPr id="3" name="Content Placeholder 2">
+            <a:extLst>
+              <a:ext uri="{FF2B5EF4-FFF2-40B4-BE49-F238E27FC236}">
+                <a16:creationId xmlns:a16="http://schemas.microsoft.com/office/drawing/2014/main" id="{C386DD75-7F4C-49E7-B324-1AFE02C7D3CE}"/>
+              </a:ext>
+            </a:extLst>
+          </p:cNvPr>
+          <p:cNvSpPr>
+            <a:spLocks noGrp="1"/>
+          </p:cNvSpPr>
+          <p:nvPr>
+            <p:ph idx="1"/>
+          </p:nvPr>
+        </p:nvSpPr>
+        <p:spPr>
+          <a:xfrm>
+            <a:off x="2231136" y="2585543"/>
+            <a:ext cx="7729728" cy="1188720"/>
+          </a:xfrm>
+        </p:spPr>
+        <p:txBody>
+          <a:bodyPr>
+            <a:normAutofit/>
+          </a:bodyPr>
+          <a:lstStyle/>
+          <a:p>
+            <a:pPr algn="r"/>
+            <a:r>
+              <a:rPr lang="he-IL" sz="2000" b="1" u="sng" dirty="0"/>
+              <a:t>הגדרה: </a:t>
+            </a:r>
+          </a:p>
+          <a:p>
+            <a:pPr algn="r"/>
+            <a:r>
+              <a:rPr lang="en-US" sz="1600" dirty="0"/>
+              <a:t>K-SET</a:t>
+            </a:r>
+            <a:r>
+              <a:rPr lang="he-IL" sz="1600" dirty="0"/>
+              <a:t> של קבוצת נקודות סופית </a:t>
+            </a:r>
+            <a:r>
+              <a:rPr lang="en-US" sz="1600" dirty="0"/>
+              <a:t>P</a:t>
+            </a:r>
+            <a:r>
+              <a:rPr lang="he-IL" sz="1600" dirty="0"/>
+              <a:t> במישור (דו-מימד) היא תת קבוצה של </a:t>
+            </a:r>
+            <a:r>
+              <a:rPr lang="en-US" sz="1600" dirty="0"/>
+              <a:t>P</a:t>
+            </a:r>
+            <a:r>
+              <a:rPr lang="he-IL" sz="1600" dirty="0"/>
+              <a:t> בגודל </a:t>
+            </a:r>
+            <a:r>
+              <a:rPr lang="en-US" sz="1600" dirty="0"/>
+              <a:t>K</a:t>
+            </a:r>
+            <a:r>
+              <a:rPr lang="he-IL" sz="1600" dirty="0"/>
+              <a:t> שניתן להפריד אותה משאר הנקודות ב</a:t>
+            </a:r>
+            <a:r>
+              <a:rPr lang="en-US" sz="1600" dirty="0"/>
+              <a:t>P</a:t>
+            </a:r>
+            <a:r>
+              <a:rPr lang="he-IL" sz="1600" dirty="0"/>
+              <a:t> ע"י ישר</a:t>
+            </a:r>
+            <a:endParaRPr lang="en-US" sz="1600" dirty="0"/>
+          </a:p>
+          <a:p>
+            <a:pPr algn="l" rtl="0"/>
+            <a:endParaRPr lang="he-IL" sz="1600" dirty="0"/>
+          </a:p>
+        </p:txBody>
+      </p:sp>
+      <p:sp>
+        <p:nvSpPr>
+          <p:cNvPr id="7" name="TextBox 6">
+            <a:extLst>
+              <a:ext uri="{FF2B5EF4-FFF2-40B4-BE49-F238E27FC236}">
+                <a16:creationId xmlns:a16="http://schemas.microsoft.com/office/drawing/2014/main" id="{34AEB813-003C-41AF-A473-69090BE8DA1A}"/>
+              </a:ext>
+            </a:extLst>
+          </p:cNvPr>
+          <p:cNvSpPr txBox="1"/>
+          <p:nvPr/>
+        </p:nvSpPr>
+        <p:spPr>
+          <a:xfrm>
+            <a:off x="5245773" y="4375367"/>
+            <a:ext cx="4782012" cy="1200329"/>
+          </a:xfrm>
+          <a:prstGeom prst="rect">
+            <a:avLst/>
+          </a:prstGeom>
+          <a:noFill/>
+        </p:spPr>
+        <p:txBody>
+          <a:bodyPr wrap="square" rtlCol="1">
+            <a:spAutoFit/>
+          </a:bodyPr>
+          <a:lstStyle/>
+          <a:p>
+            <a:pPr algn="r" rtl="1"/>
+            <a:r>
+              <a:rPr lang="he-IL" dirty="0"/>
+              <a:t>לדוגמא, עבור קבוצה בגודל 12 עבור </a:t>
+            </a:r>
+            <a:r>
+              <a:rPr lang="en-US" dirty="0"/>
+              <a:t>k=5</a:t>
+            </a:r>
+          </a:p>
+          <a:p>
+            <a:pPr algn="r" rtl="1"/>
+            <a:endParaRPr lang="en-US" dirty="0"/>
+          </a:p>
+          <a:p>
+            <a:pPr algn="r" rtl="1"/>
+            <a:r>
+              <a:rPr lang="he-IL" dirty="0"/>
+              <a:t>*חשוב לשים לב שכל צד הוא </a:t>
+            </a:r>
+            <a:r>
+              <a:rPr lang="en-US" dirty="0"/>
+              <a:t>5-set</a:t>
+            </a:r>
+            <a:r>
+              <a:rPr lang="he-IL" dirty="0"/>
+              <a:t> בפני עצמו</a:t>
+            </a:r>
+          </a:p>
+          <a:p>
+            <a:pPr algn="r" rtl="1"/>
+            <a:endParaRPr lang="he-IL" dirty="0"/>
+          </a:p>
+        </p:txBody>
+      </p:sp>
+      <p:pic>
+        <p:nvPicPr>
+          <p:cNvPr id="9" name="Picture 8">
+            <a:extLst>
+              <a:ext uri="{FF2B5EF4-FFF2-40B4-BE49-F238E27FC236}">
+                <a16:creationId xmlns:a16="http://schemas.microsoft.com/office/drawing/2014/main" id="{32C75766-767A-45EE-AB56-A12138B62FDD}"/>
+              </a:ext>
+            </a:extLst>
+          </p:cNvPr>
+          <p:cNvPicPr>
+            <a:picLocks noChangeAspect="1"/>
+          </p:cNvPicPr>
+          <p:nvPr/>
+        </p:nvPicPr>
+        <p:blipFill>
+          <a:blip r:embed="rId2"/>
+          <a:stretch>
+            <a:fillRect/>
+          </a:stretch>
+        </p:blipFill>
+        <p:spPr>
+          <a:xfrm>
+            <a:off x="699082" y="3888914"/>
+            <a:ext cx="5038987" cy="2167937"/>
+          </a:xfrm>
+          <a:prstGeom prst="rect">
+            <a:avLst/>
+          </a:prstGeom>
+        </p:spPr>
+      </p:pic>
+    </p:spTree>
+    <p:extLst>
+      <p:ext uri="{BB962C8B-B14F-4D97-AF65-F5344CB8AC3E}">
+        <p14:creationId xmlns:p14="http://schemas.microsoft.com/office/powerpoint/2010/main" val="2976200407"/>
+      </p:ext>
+    </p:extLst>
+  </p:cSld>
+  <p:clrMapOvr>
+    <a:masterClrMapping/>
+  </p:clrMapOvr>
+</p:sld>
+</file>
+
+<file path=ppt/slides/slide20.xml><?xml version="1.0" encoding="utf-8"?>
 <p:sld xmlns:a="http://schemas.openxmlformats.org/drawingml/2006/main" xmlns:r="http://schemas.openxmlformats.org/officeDocument/2006/relationships" xmlns:p="http://schemas.openxmlformats.org/presentationml/2006/main">
   <p:cSld>
     <p:spTree>
@@ -5220,7 +6240,7 @@
 </p:sld>
 </file>
 
-<file path=ppt/slides/slide18.xml><?xml version="1.0" encoding="utf-8"?>
+<file path=ppt/slides/slide21.xml><?xml version="1.0" encoding="utf-8"?>
 <p:sld xmlns:a="http://schemas.openxmlformats.org/drawingml/2006/main" xmlns:r="http://schemas.openxmlformats.org/officeDocument/2006/relationships" xmlns:p="http://schemas.openxmlformats.org/presentationml/2006/main">
   <p:cSld>
     <p:spTree>
@@ -5571,7 +6591,7 @@
 </p:sld>
 </file>
 
-<file path=ppt/slides/slide19.xml><?xml version="1.0" encoding="utf-8"?>
+<file path=ppt/slides/slide22.xml><?xml version="1.0" encoding="utf-8"?>
 <p:sld xmlns:a="http://schemas.openxmlformats.org/drawingml/2006/main" xmlns:r="http://schemas.openxmlformats.org/officeDocument/2006/relationships" xmlns:p="http://schemas.openxmlformats.org/presentationml/2006/main">
   <p:cSld>
     <p:spTree>
@@ -5819,7 +6839,7 @@
 </p:sld>
 </file>
 
-<file path=ppt/slides/slide2.xml><?xml version="1.0" encoding="utf-8"?>
+<file path=ppt/slides/slide23.xml><?xml version="1.0" encoding="utf-8"?>
 <p:sld xmlns:a="http://schemas.openxmlformats.org/drawingml/2006/main" xmlns:r="http://schemas.openxmlformats.org/officeDocument/2006/relationships" xmlns:p="http://schemas.openxmlformats.org/presentationml/2006/main">
   <p:cSld>
     <p:spTree>
@@ -5841,7 +6861,7 @@
           <p:cNvPr id="2" name="Title 1">
             <a:extLst>
               <a:ext uri="{FF2B5EF4-FFF2-40B4-BE49-F238E27FC236}">
-                <a16:creationId xmlns:a16="http://schemas.microsoft.com/office/drawing/2014/main" id="{05AE25FC-4EFC-4295-9A3C-6DCB52DDB3A8}"/>
+                <a16:creationId xmlns:a16="http://schemas.microsoft.com/office/drawing/2014/main" id="{9659BF35-3A32-4FD5-A109-BCC3D3563180}"/>
               </a:ext>
             </a:extLst>
           </p:cNvPr>
@@ -5859,9 +6879,16 @@
           <a:p>
             <a:r>
               <a:rPr lang="en-US" dirty="0"/>
-              <a:t>k-set</a:t>
-            </a:r>
-            <a:endParaRPr lang="he-IL" dirty="0"/>
+              <a:t>Convex chain </a:t>
+            </a:r>
+            <a:r>
+              <a:rPr lang="en-US" dirty="0" err="1"/>
+              <a:t>cont</a:t>
+            </a:r>
+            <a:r>
+              <a:rPr lang="en-US" dirty="0"/>
+              <a:t>’ (lemma 1)</a:t>
+            </a:r>
           </a:p>
         </p:txBody>
       </p:sp>
@@ -5870,7 +6897,7 @@
           <p:cNvPr id="3" name="Content Placeholder 2">
             <a:extLst>
               <a:ext uri="{FF2B5EF4-FFF2-40B4-BE49-F238E27FC236}">
-                <a16:creationId xmlns:a16="http://schemas.microsoft.com/office/drawing/2014/main" id="{C386DD75-7F4C-49E7-B324-1AFE02C7D3CE}"/>
+                <a16:creationId xmlns:a16="http://schemas.microsoft.com/office/drawing/2014/main" id="{CEB31987-0421-4A48-BAB5-2D2C26A07E90}"/>
               </a:ext>
             </a:extLst>
           </p:cNvPr>
@@ -5883,169 +6910,193 @@
         </p:nvSpPr>
         <p:spPr>
           <a:xfrm>
-            <a:off x="2231136" y="2585543"/>
-            <a:ext cx="7729728" cy="1188720"/>
+            <a:off x="2231136" y="2638044"/>
+            <a:ext cx="8058270" cy="3551000"/>
           </a:xfrm>
         </p:spPr>
         <p:txBody>
-          <a:bodyPr>
-            <a:normAutofit/>
-          </a:bodyPr>
-          <a:lstStyle/>
-          <a:p>
-            <a:pPr algn="r"/>
-            <a:r>
-              <a:rPr lang="he-IL" sz="2000" b="1" u="sng" dirty="0"/>
-              <a:t>הגדרה: </a:t>
-            </a:r>
-          </a:p>
-          <a:p>
-            <a:pPr algn="r"/>
-            <a:r>
-              <a:rPr lang="en-US" sz="1600" dirty="0"/>
-              <a:t>K-SET</a:t>
-            </a:r>
-            <a:r>
-              <a:rPr lang="he-IL" sz="1600" dirty="0"/>
-              <a:t> של קבוצת נקודות סופית </a:t>
-            </a:r>
-            <a:r>
-              <a:rPr lang="en-US" sz="1600" dirty="0"/>
-              <a:t>P</a:t>
-            </a:r>
-            <a:r>
-              <a:rPr lang="he-IL" sz="1600" dirty="0"/>
-              <a:t> במישור (דו-מימד) היא תת קבוצה של </a:t>
-            </a:r>
-            <a:r>
-              <a:rPr lang="en-US" sz="1600" dirty="0"/>
-              <a:t>P</a:t>
-            </a:r>
-            <a:r>
-              <a:rPr lang="he-IL" sz="1600" dirty="0"/>
-              <a:t> בגודל </a:t>
-            </a:r>
-            <a:r>
-              <a:rPr lang="en-US" sz="1600" dirty="0"/>
-              <a:t>K</a:t>
-            </a:r>
-            <a:r>
-              <a:rPr lang="he-IL" sz="1600" dirty="0"/>
-              <a:t> שניתן להפריד אותה משאר הנקודות ב</a:t>
-            </a:r>
-            <a:r>
-              <a:rPr lang="en-US" sz="1600" dirty="0"/>
-              <a:t>P</a:t>
-            </a:r>
-            <a:r>
-              <a:rPr lang="he-IL" sz="1600" dirty="0"/>
-              <a:t> ע"י ישר</a:t>
-            </a:r>
-            <a:endParaRPr lang="en-US" sz="1600" dirty="0"/>
-          </a:p>
-          <a:p>
-            <a:pPr algn="l" rtl="0"/>
-            <a:endParaRPr lang="he-IL" sz="1600" dirty="0"/>
-          </a:p>
-        </p:txBody>
-      </p:sp>
-      <p:sp>
-        <p:nvSpPr>
-          <p:cNvPr id="7" name="TextBox 6">
-            <a:extLst>
-              <a:ext uri="{FF2B5EF4-FFF2-40B4-BE49-F238E27FC236}">
-                <a16:creationId xmlns:a16="http://schemas.microsoft.com/office/drawing/2014/main" id="{34AEB813-003C-41AF-A473-69090BE8DA1A}"/>
-              </a:ext>
-            </a:extLst>
-          </p:cNvPr>
-          <p:cNvSpPr txBox="1"/>
-          <p:nvPr/>
-        </p:nvSpPr>
-        <p:spPr>
-          <a:xfrm>
-            <a:off x="5245773" y="4375367"/>
-            <a:ext cx="4782012" cy="1200329"/>
-          </a:xfrm>
-          <a:prstGeom prst="rect">
-            <a:avLst/>
-          </a:prstGeom>
-          <a:noFill/>
-        </p:spPr>
-        <p:txBody>
-          <a:bodyPr wrap="square" rtlCol="1">
-            <a:spAutoFit/>
-          </a:bodyPr>
-          <a:lstStyle/>
-          <a:p>
-            <a:pPr algn="r" rtl="1"/>
-            <a:r>
-              <a:rPr lang="he-IL" dirty="0"/>
-              <a:t>לדוגמא, עבור קבוצה בגודל 12 עבור </a:t>
-            </a:r>
-            <a:r>
-              <a:rPr lang="en-US" dirty="0"/>
-              <a:t>k=5</a:t>
-            </a:r>
-          </a:p>
-          <a:p>
-            <a:pPr algn="r" rtl="1"/>
+          <a:bodyPr/>
+          <a:lstStyle/>
+          <a:p>
+            <a:r>
+              <a:rPr lang="en-US" dirty="0"/>
+              <a:t>Lemma</a:t>
+            </a:r>
+            <a:r>
+              <a:rPr lang="he-IL" dirty="0"/>
+              <a:t>- לא קיימת אף צלע </a:t>
+            </a:r>
+            <a:r>
+              <a:rPr lang="en-US" dirty="0"/>
+              <a:t>f</a:t>
+            </a:r>
+            <a:r>
+              <a:rPr lang="he-IL" dirty="0"/>
+              <a:t> כך שמתקיים </a:t>
+            </a:r>
+            <a:r>
+              <a:rPr lang="en-US" dirty="0" err="1"/>
+              <a:t>eRf</a:t>
+            </a:r>
+            <a:r>
+              <a:rPr lang="he-IL" dirty="0"/>
+              <a:t> וגם מתקיים </a:t>
+            </a:r>
+            <a:r>
+              <a:rPr lang="en-US" dirty="0" err="1"/>
+              <a:t>gRf</a:t>
+            </a:r>
+            <a:r>
+              <a:rPr lang="he-IL" dirty="0"/>
+              <a:t> עבור </a:t>
+            </a:r>
+            <a:r>
+              <a:rPr lang="en-US" dirty="0"/>
+              <a:t>g!=e</a:t>
+            </a:r>
+          </a:p>
+          <a:p>
+            <a:r>
+              <a:rPr lang="he-IL" dirty="0"/>
+              <a:t>הוכחה:</a:t>
+            </a:r>
             <a:endParaRPr lang="en-US" dirty="0"/>
           </a:p>
           <a:p>
-            <a:pPr algn="r" rtl="1"/>
-            <a:r>
-              <a:rPr lang="he-IL" dirty="0"/>
-              <a:t>*חשוב לשים לב שכל צד הוא </a:t>
-            </a:r>
-            <a:r>
-              <a:rPr lang="en-US" dirty="0"/>
-              <a:t>5-set</a:t>
-            </a:r>
-            <a:r>
-              <a:rPr lang="he-IL" dirty="0"/>
-              <a:t> בפני עצמו</a:t>
-            </a:r>
-          </a:p>
-          <a:p>
-            <a:pPr algn="r" rtl="1"/>
-            <a:endParaRPr lang="he-IL" dirty="0"/>
-          </a:p>
-        </p:txBody>
-      </p:sp>
-      <p:pic>
-        <p:nvPicPr>
-          <p:cNvPr id="9" name="Picture 8">
-            <a:extLst>
-              <a:ext uri="{FF2B5EF4-FFF2-40B4-BE49-F238E27FC236}">
-                <a16:creationId xmlns:a16="http://schemas.microsoft.com/office/drawing/2014/main" id="{32C75766-767A-45EE-AB56-A12138B62FDD}"/>
-              </a:ext>
-            </a:extLst>
-          </p:cNvPr>
-          <p:cNvPicPr>
-            <a:picLocks noChangeAspect="1"/>
-          </p:cNvPicPr>
-          <p:nvPr/>
-        </p:nvPicPr>
-        <p:blipFill>
-          <a:blip r:embed="rId2"/>
-          <a:stretch>
-            <a:fillRect/>
-          </a:stretch>
-        </p:blipFill>
-        <p:spPr>
-          <a:xfrm>
-            <a:off x="699082" y="3888914"/>
-            <a:ext cx="5038987" cy="2167937"/>
-          </a:xfrm>
-          <a:prstGeom prst="rect">
-            <a:avLst/>
-          </a:prstGeom>
-        </p:spPr>
-      </p:pic>
+            <a:pPr lvl="1"/>
+            <a:r>
+              <a:rPr lang="he-IL" dirty="0"/>
+              <a:t> נניח שקיים </a:t>
+            </a:r>
+            <a:r>
+              <a:rPr lang="en-US" dirty="0"/>
+              <a:t>f</a:t>
+            </a:r>
+            <a:r>
+              <a:rPr lang="he-IL" dirty="0"/>
+              <a:t> כזה, יהיו </a:t>
+            </a:r>
+            <a:r>
+              <a:rPr lang="en-US" dirty="0" err="1"/>
+              <a:t>g,e</a:t>
+            </a:r>
+            <a:r>
+              <a:rPr lang="he-IL" dirty="0"/>
+              <a:t> כך ש</a:t>
+            </a:r>
+            <a:r>
+              <a:rPr lang="en-US" dirty="0"/>
+              <a:t>s(e)&gt;s(g)</a:t>
+            </a:r>
+            <a:r>
+              <a:rPr lang="he-IL" dirty="0"/>
+              <a:t> </a:t>
+            </a:r>
+            <a:endParaRPr lang="en-US" dirty="0"/>
+          </a:p>
+          <a:p>
+            <a:pPr lvl="1"/>
+            <a:r>
+              <a:rPr lang="he-IL" dirty="0"/>
+              <a:t>לפי ההגדה </a:t>
+            </a:r>
+            <a:r>
+              <a:rPr lang="en-US" dirty="0"/>
+              <a:t>s(g)&gt;s(f)</a:t>
+            </a:r>
+            <a:r>
+              <a:rPr lang="he-IL" dirty="0"/>
+              <a:t> וגם </a:t>
+            </a:r>
+            <a:r>
+              <a:rPr lang="en-US" dirty="0"/>
+              <a:t>s(e)&gt;s(f)</a:t>
+            </a:r>
+          </a:p>
+          <a:p>
+            <a:pPr lvl="1"/>
+            <a:r>
+              <a:rPr lang="he-IL" dirty="0"/>
+              <a:t>לפי התכונה של </a:t>
+            </a:r>
+            <a:r>
+              <a:rPr lang="en-US" dirty="0" err="1"/>
+              <a:t>Lov’asz</a:t>
+            </a:r>
+            <a:r>
+              <a:rPr lang="he-IL" dirty="0"/>
+              <a:t> חייבת להיות צלע יוצאת </a:t>
+            </a:r>
+            <a:r>
+              <a:rPr lang="en-US" dirty="0"/>
+              <a:t>f’</a:t>
+            </a:r>
+            <a:r>
+              <a:rPr lang="he-IL" dirty="0"/>
+              <a:t> כך ש</a:t>
+            </a:r>
+            <a:r>
+              <a:rPr lang="en-US" dirty="0"/>
+              <a:t>s(e)&gt;s(f’)&gt;s(g)</a:t>
+            </a:r>
+          </a:p>
+          <a:p>
+            <a:pPr lvl="1"/>
+            <a:r>
+              <a:rPr lang="he-IL" dirty="0"/>
+              <a:t>לכן נקבל ש</a:t>
+            </a:r>
+            <a:r>
+              <a:rPr lang="en-US" dirty="0"/>
+              <a:t>s(e)&gt;s(f’)&gt;s(g)&gt;s(f)</a:t>
+            </a:r>
+            <a:r>
+              <a:rPr lang="he-IL" dirty="0"/>
+              <a:t> אבל זו סתירה ל</a:t>
+            </a:r>
+            <a:r>
+              <a:rPr lang="en-US" dirty="0" err="1"/>
+              <a:t>eRf</a:t>
+            </a:r>
+            <a:endParaRPr lang="en-US" dirty="0"/>
+          </a:p>
+          <a:p>
+            <a:r>
+              <a:rPr lang="he-IL" dirty="0"/>
+              <a:t>קבוצת היחסים הרפלקסיבית </a:t>
+            </a:r>
+            <a:r>
+              <a:rPr lang="en-US" dirty="0"/>
+              <a:t>R*</a:t>
+            </a:r>
+            <a:r>
+              <a:rPr lang="he-IL" dirty="0"/>
+              <a:t> מחלקת את </a:t>
+            </a:r>
+            <a:r>
+              <a:rPr lang="en-US" dirty="0" err="1"/>
+              <a:t>Ek</a:t>
+            </a:r>
+            <a:r>
+              <a:rPr lang="he-IL" dirty="0"/>
+              <a:t> לשרשראות לא חופפות לפי הלמה ובנוסף לי הגדרת היחס </a:t>
+            </a:r>
+            <a:r>
+              <a:rPr lang="en-US" dirty="0"/>
+              <a:t>R</a:t>
+            </a:r>
+            <a:r>
+              <a:rPr lang="he-IL" dirty="0"/>
+              <a:t> כל שרשרת כזאת היא קונבקסית (תמיד פונים רק ימינה)</a:t>
+            </a:r>
+            <a:endParaRPr lang="en-US" dirty="0"/>
+          </a:p>
+        </p:txBody>
+      </p:sp>
     </p:spTree>
     <p:extLst>
       <p:ext uri="{BB962C8B-B14F-4D97-AF65-F5344CB8AC3E}">
-        <p14:creationId xmlns:p14="http://schemas.microsoft.com/office/powerpoint/2010/main" val="2976200407"/>
+        <p14:creationId xmlns:p14="http://schemas.microsoft.com/office/powerpoint/2010/main" val="2295642179"/>
       </p:ext>
     </p:extLst>
   </p:cSld>
@@ -6055,7 +7106,7 @@
 </p:sld>
 </file>
 
-<file path=ppt/slides/slide20.xml><?xml version="1.0" encoding="utf-8"?>
+<file path=ppt/slides/slide24.xml><?xml version="1.0" encoding="utf-8"?>
 <p:sld xmlns:a="http://schemas.openxmlformats.org/drawingml/2006/main" xmlns:r="http://schemas.openxmlformats.org/officeDocument/2006/relationships" xmlns:p="http://schemas.openxmlformats.org/presentationml/2006/main">
   <p:cSld>
     <p:spTree>
@@ -6077,273 +7128,6 @@
           <p:cNvPr id="2" name="Title 1">
             <a:extLst>
               <a:ext uri="{FF2B5EF4-FFF2-40B4-BE49-F238E27FC236}">
-                <a16:creationId xmlns:a16="http://schemas.microsoft.com/office/drawing/2014/main" id="{9659BF35-3A32-4FD5-A109-BCC3D3563180}"/>
-              </a:ext>
-            </a:extLst>
-          </p:cNvPr>
-          <p:cNvSpPr>
-            <a:spLocks noGrp="1"/>
-          </p:cNvSpPr>
-          <p:nvPr>
-            <p:ph type="title"/>
-          </p:nvPr>
-        </p:nvSpPr>
-        <p:spPr/>
-        <p:txBody>
-          <a:bodyPr/>
-          <a:lstStyle/>
-          <a:p>
-            <a:r>
-              <a:rPr lang="en-US" dirty="0"/>
-              <a:t>Convex chain </a:t>
-            </a:r>
-            <a:r>
-              <a:rPr lang="en-US" dirty="0" err="1"/>
-              <a:t>cont</a:t>
-            </a:r>
-            <a:r>
-              <a:rPr lang="en-US" dirty="0"/>
-              <a:t>’ (lemma 1)</a:t>
-            </a:r>
-          </a:p>
-        </p:txBody>
-      </p:sp>
-      <p:sp>
-        <p:nvSpPr>
-          <p:cNvPr id="3" name="Content Placeholder 2">
-            <a:extLst>
-              <a:ext uri="{FF2B5EF4-FFF2-40B4-BE49-F238E27FC236}">
-                <a16:creationId xmlns:a16="http://schemas.microsoft.com/office/drawing/2014/main" id="{CEB31987-0421-4A48-BAB5-2D2C26A07E90}"/>
-              </a:ext>
-            </a:extLst>
-          </p:cNvPr>
-          <p:cNvSpPr>
-            <a:spLocks noGrp="1"/>
-          </p:cNvSpPr>
-          <p:nvPr>
-            <p:ph idx="1"/>
-          </p:nvPr>
-        </p:nvSpPr>
-        <p:spPr>
-          <a:xfrm>
-            <a:off x="2231136" y="2638044"/>
-            <a:ext cx="8058270" cy="3551000"/>
-          </a:xfrm>
-        </p:spPr>
-        <p:txBody>
-          <a:bodyPr/>
-          <a:lstStyle/>
-          <a:p>
-            <a:r>
-              <a:rPr lang="en-US" dirty="0"/>
-              <a:t>Lemma</a:t>
-            </a:r>
-            <a:r>
-              <a:rPr lang="he-IL" dirty="0"/>
-              <a:t>- לא קיימת אף צלע </a:t>
-            </a:r>
-            <a:r>
-              <a:rPr lang="en-US" dirty="0"/>
-              <a:t>f</a:t>
-            </a:r>
-            <a:r>
-              <a:rPr lang="he-IL" dirty="0"/>
-              <a:t> כך שמתקיים </a:t>
-            </a:r>
-            <a:r>
-              <a:rPr lang="en-US" dirty="0" err="1"/>
-              <a:t>eRf</a:t>
-            </a:r>
-            <a:r>
-              <a:rPr lang="he-IL" dirty="0"/>
-              <a:t> וגם מתקיים </a:t>
-            </a:r>
-            <a:r>
-              <a:rPr lang="en-US" dirty="0" err="1"/>
-              <a:t>gRf</a:t>
-            </a:r>
-            <a:r>
-              <a:rPr lang="he-IL" dirty="0"/>
-              <a:t> עבור </a:t>
-            </a:r>
-            <a:r>
-              <a:rPr lang="en-US" dirty="0"/>
-              <a:t>g!=e</a:t>
-            </a:r>
-          </a:p>
-          <a:p>
-            <a:r>
-              <a:rPr lang="he-IL" dirty="0"/>
-              <a:t>הוכחה:</a:t>
-            </a:r>
-            <a:endParaRPr lang="en-US" dirty="0"/>
-          </a:p>
-          <a:p>
-            <a:pPr lvl="1"/>
-            <a:r>
-              <a:rPr lang="he-IL" dirty="0"/>
-              <a:t> נניח שקיים </a:t>
-            </a:r>
-            <a:r>
-              <a:rPr lang="en-US" dirty="0"/>
-              <a:t>f</a:t>
-            </a:r>
-            <a:r>
-              <a:rPr lang="he-IL" dirty="0"/>
-              <a:t> כזה, יהיו </a:t>
-            </a:r>
-            <a:r>
-              <a:rPr lang="en-US" dirty="0" err="1"/>
-              <a:t>g,e</a:t>
-            </a:r>
-            <a:r>
-              <a:rPr lang="he-IL" dirty="0"/>
-              <a:t> כך ש</a:t>
-            </a:r>
-            <a:r>
-              <a:rPr lang="en-US" dirty="0"/>
-              <a:t>s(e)&gt;s(g)</a:t>
-            </a:r>
-            <a:r>
-              <a:rPr lang="he-IL" dirty="0"/>
-              <a:t> </a:t>
-            </a:r>
-            <a:endParaRPr lang="en-US" dirty="0"/>
-          </a:p>
-          <a:p>
-            <a:pPr lvl="1"/>
-            <a:r>
-              <a:rPr lang="he-IL" dirty="0"/>
-              <a:t>לפי ההגדה </a:t>
-            </a:r>
-            <a:r>
-              <a:rPr lang="en-US" dirty="0"/>
-              <a:t>s(g)&gt;s(f)</a:t>
-            </a:r>
-            <a:r>
-              <a:rPr lang="he-IL" dirty="0"/>
-              <a:t> וגם </a:t>
-            </a:r>
-            <a:r>
-              <a:rPr lang="en-US" dirty="0"/>
-              <a:t>s(e)&gt;s(f)</a:t>
-            </a:r>
-          </a:p>
-          <a:p>
-            <a:pPr lvl="1"/>
-            <a:r>
-              <a:rPr lang="he-IL" dirty="0"/>
-              <a:t>לפי התכונה של </a:t>
-            </a:r>
-            <a:r>
-              <a:rPr lang="en-US" dirty="0" err="1"/>
-              <a:t>Lov’asz</a:t>
-            </a:r>
-            <a:r>
-              <a:rPr lang="he-IL" dirty="0"/>
-              <a:t> חייבת להיות צלע יוצאת </a:t>
-            </a:r>
-            <a:r>
-              <a:rPr lang="en-US" dirty="0"/>
-              <a:t>f’</a:t>
-            </a:r>
-            <a:r>
-              <a:rPr lang="he-IL" dirty="0"/>
-              <a:t> כך ש</a:t>
-            </a:r>
-            <a:r>
-              <a:rPr lang="en-US" dirty="0"/>
-              <a:t>s(e)&gt;s(f’)&gt;s(g)</a:t>
-            </a:r>
-          </a:p>
-          <a:p>
-            <a:pPr lvl="1"/>
-            <a:r>
-              <a:rPr lang="he-IL" dirty="0"/>
-              <a:t>לכן נקבל ש</a:t>
-            </a:r>
-            <a:r>
-              <a:rPr lang="en-US" dirty="0"/>
-              <a:t>s(e)&gt;s(f’)&gt;s(g)&gt;s(f)</a:t>
-            </a:r>
-            <a:r>
-              <a:rPr lang="he-IL" dirty="0"/>
-              <a:t> אבל זו סתירה ל</a:t>
-            </a:r>
-            <a:r>
-              <a:rPr lang="en-US" dirty="0" err="1"/>
-              <a:t>eRf</a:t>
-            </a:r>
-            <a:endParaRPr lang="en-US" dirty="0"/>
-          </a:p>
-          <a:p>
-            <a:r>
-              <a:rPr lang="he-IL" dirty="0"/>
-              <a:t>קבוצת היחסים הרפלקסיבית </a:t>
-            </a:r>
-            <a:r>
-              <a:rPr lang="en-US" dirty="0"/>
-              <a:t>R*</a:t>
-            </a:r>
-            <a:r>
-              <a:rPr lang="he-IL" dirty="0"/>
-              <a:t> מחלקת את </a:t>
-            </a:r>
-            <a:r>
-              <a:rPr lang="en-US" dirty="0" err="1"/>
-              <a:t>Ek</a:t>
-            </a:r>
-            <a:r>
-              <a:rPr lang="he-IL" dirty="0"/>
-              <a:t> לשרשראות לא חופפות לפי הלמה ובנוסף לי הגדרת היחס </a:t>
-            </a:r>
-            <a:r>
-              <a:rPr lang="en-US" dirty="0"/>
-              <a:t>R</a:t>
-            </a:r>
-            <a:r>
-              <a:rPr lang="he-IL" dirty="0"/>
-              <a:t> כל שרשרת כזאת היא קונבקסית (תמיד פונים רק ימינה)</a:t>
-            </a:r>
-            <a:endParaRPr lang="en-US" dirty="0"/>
-          </a:p>
-        </p:txBody>
-      </p:sp>
-    </p:spTree>
-    <p:extLst>
-      <p:ext uri="{BB962C8B-B14F-4D97-AF65-F5344CB8AC3E}">
-        <p14:creationId xmlns:p14="http://schemas.microsoft.com/office/powerpoint/2010/main" val="2295642179"/>
-      </p:ext>
-    </p:extLst>
-  </p:cSld>
-  <p:clrMapOvr>
-    <a:masterClrMapping/>
-  </p:clrMapOvr>
-</p:sld>
-</file>
-
-<file path=ppt/slides/slide21.xml><?xml version="1.0" encoding="utf-8"?>
-<p:sld xmlns:a="http://schemas.openxmlformats.org/drawingml/2006/main" xmlns:r="http://schemas.openxmlformats.org/officeDocument/2006/relationships" xmlns:p="http://schemas.openxmlformats.org/presentationml/2006/main">
-  <p:cSld>
-    <p:spTree>
-      <p:nvGrpSpPr>
-        <p:cNvPr id="1" name=""/>
-        <p:cNvGrpSpPr/>
-        <p:nvPr/>
-      </p:nvGrpSpPr>
-      <p:grpSpPr>
-        <a:xfrm>
-          <a:off x="0" y="0"/>
-          <a:ext cx="0" cy="0"/>
-          <a:chOff x="0" y="0"/>
-          <a:chExt cx="0" cy="0"/>
-        </a:xfrm>
-      </p:grpSpPr>
-      <p:sp>
-        <p:nvSpPr>
-          <p:cNvPr id="2" name="Title 1">
-            <a:extLst>
-              <a:ext uri="{FF2B5EF4-FFF2-40B4-BE49-F238E27FC236}">
                 <a16:creationId xmlns:a16="http://schemas.microsoft.com/office/drawing/2014/main" id="{830960BC-AAC1-42A9-86CF-77F226E2A9DA}"/>
               </a:ext>
             </a:extLst>
@@ -6518,7 +7302,7 @@
 </p:sld>
 </file>
 
-<file path=ppt/slides/slide22.xml><?xml version="1.0" encoding="utf-8"?>
+<file path=ppt/slides/slide25.xml><?xml version="1.0" encoding="utf-8"?>
 <p:sld xmlns:a="http://schemas.openxmlformats.org/drawingml/2006/main" xmlns:r="http://schemas.openxmlformats.org/officeDocument/2006/relationships" xmlns:p="http://schemas.openxmlformats.org/presentationml/2006/main">
   <p:cSld>
     <p:spTree>
@@ -6747,7 +7531,7 @@
 </p:sld>
 </file>
 
-<file path=ppt/slides/slide23.xml><?xml version="1.0" encoding="utf-8"?>
+<file path=ppt/slides/slide26.xml><?xml version="1.0" encoding="utf-8"?>
 <p:sld xmlns:a="http://schemas.openxmlformats.org/drawingml/2006/main" xmlns:r="http://schemas.openxmlformats.org/officeDocument/2006/relationships" xmlns:p="http://schemas.openxmlformats.org/presentationml/2006/main">
   <p:cSld>
     <p:spTree>
@@ -7155,7 +7939,7 @@
 </p:sld>
 </file>
 
-<file path=ppt/slides/slide24.xml><?xml version="1.0" encoding="utf-8"?>
+<file path=ppt/slides/slide27.xml><?xml version="1.0" encoding="utf-8"?>
 <p:sld xmlns:a="http://schemas.openxmlformats.org/drawingml/2006/main" xmlns:r="http://schemas.openxmlformats.org/officeDocument/2006/relationships" xmlns:p="http://schemas.openxmlformats.org/presentationml/2006/main">
   <p:cSld>
     <p:spTree>
@@ -7345,7 +8129,7 @@
 </p:sld>
 </file>
 
-<file path=ppt/slides/slide25.xml><?xml version="1.0" encoding="utf-8"?>
+<file path=ppt/slides/slide28.xml><?xml version="1.0" encoding="utf-8"?>
 <p:sld xmlns:a="http://schemas.openxmlformats.org/drawingml/2006/main" xmlns:r="http://schemas.openxmlformats.org/officeDocument/2006/relationships" xmlns:p="http://schemas.openxmlformats.org/presentationml/2006/main">
   <p:cSld>
     <p:spTree>

</xml_diff>